<commit_message>
:memo: First version presentation
</commit_message>
<xml_diff>
--- a/Presentation/Presentacio.pptx
+++ b/Presentation/Presentacio.pptx
@@ -14,6 +14,14 @@
     <p:sldId id="272" r:id="rId8"/>
     <p:sldId id="273" r:id="rId9"/>
     <p:sldId id="274" r:id="rId10"/>
+    <p:sldId id="275" r:id="rId11"/>
+    <p:sldId id="276" r:id="rId12"/>
+    <p:sldId id="277" r:id="rId13"/>
+    <p:sldId id="278" r:id="rId14"/>
+    <p:sldId id="279" r:id="rId15"/>
+    <p:sldId id="280" r:id="rId16"/>
+    <p:sldId id="281" r:id="rId17"/>
+    <p:sldId id="283" r:id="rId18"/>
   </p:sldIdLst>
   <p:sldSz cx="12192000" cy="6858000"/>
   <p:notesSz cx="6858000" cy="9144000"/>
@@ -112,7 +120,16 @@
       </a:defRPr>
     </a:lvl9pPr>
   </p:defaultTextStyle>
+  <p:extLst>
+    <p:ext uri="{EFAFB233-063F-42B5-8137-9DF3F51BA10A}">
+      <p15:sldGuideLst xmlns:p15="http://schemas.microsoft.com/office/powerpoint/2012/main"/>
+    </p:ext>
+  </p:extLst>
 </p:presentation>
+</file>
+
+<file path=ppt/revisionInfo.xml><?xml version="1.0" encoding="utf-8"?>
+<p1510:revInfo xmlns:a="http://schemas.openxmlformats.org/drawingml/2006/main" xmlns:r="http://schemas.openxmlformats.org/officeDocument/2006/relationships" xmlns:p1510="http://schemas.microsoft.com/office/powerpoint/2015/10/main"/>
 </file>
 
 <file path=ppt/slideLayouts/slideLayout1.xml><?xml version="1.0" encoding="utf-8"?>
@@ -9555,7 +9572,7 @@
                 <a16:creationId xmlns:a16="http://schemas.microsoft.com/office/drawing/2014/main" id="{8C6E698C-8155-4B8B-BDC9-B7299772B509}"/>
               </a:ext>
               <a:ext uri="{C183D7F6-B498-43B3-948B-1728B52AA6E4}">
-                <adec:decorative xmlns="" xmlns:adec="http://schemas.microsoft.com/office/drawing/2017/decorative" val="1"/>
+                <adec:decorative xmlns:adec="http://schemas.microsoft.com/office/drawing/2017/decorative" xmlns="" val="1"/>
               </a:ext>
             </a:extLst>
           </p:cNvPr>
@@ -9615,7 +9632,7 @@
                 <a16:creationId xmlns:a16="http://schemas.microsoft.com/office/drawing/2014/main" id="{09525C9A-1972-4836-BA7A-706C946EF4DA}"/>
               </a:ext>
               <a:ext uri="{C183D7F6-B498-43B3-948B-1728B52AA6E4}">
-                <adec:decorative xmlns="" xmlns:adec="http://schemas.microsoft.com/office/drawing/2017/decorative" val="1"/>
+                <adec:decorative xmlns:adec="http://schemas.microsoft.com/office/drawing/2017/decorative" xmlns="" val="1"/>
               </a:ext>
             </a:extLst>
           </p:cNvPr>
@@ -9667,7 +9684,7 @@
                 <a16:creationId xmlns:a16="http://schemas.microsoft.com/office/drawing/2014/main" id="{8A549DE7-671D-4575-AF43-858FD99981CF}"/>
               </a:ext>
               <a:ext uri="{C183D7F6-B498-43B3-948B-1728B52AA6E4}">
-                <adec:decorative xmlns="" xmlns:adec="http://schemas.microsoft.com/office/drawing/2017/decorative" val="1"/>
+                <adec:decorative xmlns:adec="http://schemas.microsoft.com/office/drawing/2017/decorative" xmlns="" val="1"/>
               </a:ext>
             </a:extLst>
           </p:cNvPr>
@@ -9722,7 +9739,7 @@
                 <a16:creationId xmlns:a16="http://schemas.microsoft.com/office/drawing/2014/main" id="{C22D9B36-9BE7-472B-8808-7E0D6810738F}"/>
               </a:ext>
               <a:ext uri="{C183D7F6-B498-43B3-948B-1728B52AA6E4}">
-                <adec:decorative xmlns="" xmlns:adec="http://schemas.microsoft.com/office/drawing/2017/decorative" val="1"/>
+                <adec:decorative xmlns:adec="http://schemas.microsoft.com/office/drawing/2017/decorative" xmlns="" val="1"/>
               </a:ext>
             </a:extLst>
           </p:cNvPr>
@@ -9901,6 +9918,1374 @@
     <p:extLst>
       <p:ext uri="{BB962C8B-B14F-4D97-AF65-F5344CB8AC3E}">
         <p14:creationId xmlns:p14="http://schemas.microsoft.com/office/powerpoint/2010/main" val="2297032543"/>
+      </p:ext>
+    </p:extLst>
+  </p:cSld>
+  <p:clrMapOvr>
+    <a:masterClrMapping/>
+  </p:clrMapOvr>
+</p:sld>
+</file>
+
+<file path=ppt/slides/slide10.xml><?xml version="1.0" encoding="utf-8"?>
+<p:sld xmlns:a="http://schemas.openxmlformats.org/drawingml/2006/main" xmlns:r="http://schemas.openxmlformats.org/officeDocument/2006/relationships" xmlns:p="http://schemas.openxmlformats.org/presentationml/2006/main">
+  <p:cSld>
+    <p:bg>
+      <p:bgPr>
+        <a:solidFill>
+          <a:schemeClr val="bg1"/>
+        </a:solidFill>
+        <a:effectLst/>
+      </p:bgPr>
+    </p:bg>
+    <p:spTree>
+      <p:nvGrpSpPr>
+        <p:cNvPr id="1" name=""/>
+        <p:cNvGrpSpPr/>
+        <p:nvPr/>
+      </p:nvGrpSpPr>
+      <p:grpSpPr>
+        <a:xfrm>
+          <a:off x="0" y="0"/>
+          <a:ext cx="0" cy="0"/>
+          <a:chOff x="0" y="0"/>
+          <a:chExt cx="0" cy="0"/>
+        </a:xfrm>
+      </p:grpSpPr>
+      <p:sp>
+        <p:nvSpPr>
+          <p:cNvPr id="10" name="Rectangle 12">
+            <a:extLst>
+              <a:ext uri="{FF2B5EF4-FFF2-40B4-BE49-F238E27FC236}">
+                <a16:creationId xmlns:a16="http://schemas.microsoft.com/office/drawing/2014/main" id="{B9FF99BD-075F-4761-A995-6FC574BD25EA}"/>
+              </a:ext>
+              <a:ext uri="{C183D7F6-B498-43B3-948B-1728B52AA6E4}">
+                <adec:decorative xmlns="" xmlns:adec="http://schemas.microsoft.com/office/drawing/2017/decorative" val="1"/>
+              </a:ext>
+            </a:extLst>
+          </p:cNvPr>
+          <p:cNvSpPr>
+            <a:spLocks noGrp="1" noRot="1" noChangeAspect="1" noMove="1" noResize="1" noEditPoints="1" noAdjustHandles="1" noChangeArrowheads="1" noChangeShapeType="1" noTextEdit="1"/>
+          </p:cNvSpPr>
+          <p:nvPr>
+            <p:extLst>
+              <p:ext uri="{386F3935-93C4-4BCD-93E2-E3B085C9AB24}">
+                <p16:designElem xmlns:p16="http://schemas.microsoft.com/office/powerpoint/2015/main" val="1"/>
+              </p:ext>
+            </p:extLst>
+          </p:nvPr>
+        </p:nvSpPr>
+        <p:spPr>
+          <a:xfrm>
+            <a:off x="0" y="0"/>
+            <a:ext cx="12192000" cy="6858000"/>
+          </a:xfrm>
+          <a:prstGeom prst="rect">
+            <a:avLst/>
+          </a:prstGeom>
+          <a:solidFill>
+            <a:schemeClr val="bg1">
+              <a:lumMod val="65000"/>
+            </a:schemeClr>
+          </a:solidFill>
+          <a:ln>
+            <a:noFill/>
+          </a:ln>
+        </p:spPr>
+        <p:style>
+          <a:lnRef idx="2">
+            <a:schemeClr val="accent1">
+              <a:shade val="50000"/>
+            </a:schemeClr>
+          </a:lnRef>
+          <a:fillRef idx="1">
+            <a:schemeClr val="accent1"/>
+          </a:fillRef>
+          <a:effectRef idx="0">
+            <a:schemeClr val="accent1"/>
+          </a:effectRef>
+          <a:fontRef idx="minor">
+            <a:schemeClr val="lt1"/>
+          </a:fontRef>
+        </p:style>
+        <p:txBody>
+          <a:bodyPr rtlCol="0" anchor="ctr"/>
+          <a:lstStyle/>
+          <a:p>
+            <a:pPr algn="ctr"/>
+            <a:endParaRPr lang="en-US"/>
+          </a:p>
+        </p:txBody>
+      </p:sp>
+      <p:sp>
+        <p:nvSpPr>
+          <p:cNvPr id="15" name="Rectangle 14">
+            <a:extLst>
+              <a:ext uri="{FF2B5EF4-FFF2-40B4-BE49-F238E27FC236}">
+                <a16:creationId xmlns:a16="http://schemas.microsoft.com/office/drawing/2014/main" id="{A7B21A54-9BA3-4EA9-B460-5A829ADD9051}"/>
+              </a:ext>
+              <a:ext uri="{C183D7F6-B498-43B3-948B-1728B52AA6E4}">
+                <adec:decorative xmlns="" xmlns:adec="http://schemas.microsoft.com/office/drawing/2017/decorative" val="1"/>
+              </a:ext>
+            </a:extLst>
+          </p:cNvPr>
+          <p:cNvSpPr>
+            <a:spLocks noGrp="1" noRot="1" noChangeAspect="1" noMove="1" noResize="1" noEditPoints="1" noAdjustHandles="1" noChangeArrowheads="1" noChangeShapeType="1" noTextEdit="1"/>
+          </p:cNvSpPr>
+          <p:nvPr>
+            <p:extLst>
+              <p:ext uri="{386F3935-93C4-4BCD-93E2-E3B085C9AB24}">
+                <p16:designElem xmlns:p16="http://schemas.microsoft.com/office/powerpoint/2015/main" val="1"/>
+              </p:ext>
+            </p:extLst>
+          </p:nvPr>
+        </p:nvSpPr>
+        <p:spPr>
+          <a:xfrm>
+            <a:off x="477012" y="480060"/>
+            <a:ext cx="11237976" cy="5897880"/>
+          </a:xfrm>
+          <a:prstGeom prst="rect">
+            <a:avLst/>
+          </a:prstGeom>
+          <a:noFill/>
+          <a:ln>
+            <a:solidFill>
+              <a:schemeClr val="bg1"/>
+            </a:solidFill>
+          </a:ln>
+        </p:spPr>
+        <p:style>
+          <a:lnRef idx="2">
+            <a:schemeClr val="accent1">
+              <a:shade val="50000"/>
+            </a:schemeClr>
+          </a:lnRef>
+          <a:fillRef idx="1">
+            <a:schemeClr val="accent1"/>
+          </a:fillRef>
+          <a:effectRef idx="0">
+            <a:schemeClr val="accent1"/>
+          </a:effectRef>
+          <a:fontRef idx="minor">
+            <a:schemeClr val="lt1"/>
+          </a:fontRef>
+        </p:style>
+        <p:txBody>
+          <a:bodyPr rtlCol="0" anchor="ctr"/>
+          <a:lstStyle/>
+          <a:p>
+            <a:pPr algn="ctr"/>
+            <a:endParaRPr lang="en-US"/>
+          </a:p>
+        </p:txBody>
+      </p:sp>
+      <p:sp>
+        <p:nvSpPr>
+          <p:cNvPr id="17" name="Rectangle 16">
+            <a:extLst>
+              <a:ext uri="{FF2B5EF4-FFF2-40B4-BE49-F238E27FC236}">
+                <a16:creationId xmlns:a16="http://schemas.microsoft.com/office/drawing/2014/main" id="{6FA8F714-B9D8-488A-8CCA-E9948FF913A9}"/>
+              </a:ext>
+              <a:ext uri="{C183D7F6-B498-43B3-948B-1728B52AA6E4}">
+                <adec:decorative xmlns="" xmlns:adec="http://schemas.microsoft.com/office/drawing/2017/decorative" val="1"/>
+              </a:ext>
+            </a:extLst>
+          </p:cNvPr>
+          <p:cNvSpPr>
+            <a:spLocks noGrp="1" noRot="1" noChangeAspect="1" noMove="1" noResize="1" noEditPoints="1" noAdjustHandles="1" noChangeArrowheads="1" noChangeShapeType="1" noTextEdit="1"/>
+          </p:cNvSpPr>
+          <p:nvPr>
+            <p:extLst>
+              <p:ext uri="{386F3935-93C4-4BCD-93E2-E3B085C9AB24}">
+                <p16:designElem xmlns:p16="http://schemas.microsoft.com/office/powerpoint/2015/main" val="1"/>
+              </p:ext>
+            </p:extLst>
+          </p:nvPr>
+        </p:nvSpPr>
+        <p:spPr>
+          <a:xfrm>
+            <a:off x="643466" y="643468"/>
+            <a:ext cx="10905067" cy="5571066"/>
+          </a:xfrm>
+          <a:prstGeom prst="rect">
+            <a:avLst/>
+          </a:prstGeom>
+          <a:solidFill>
+            <a:srgbClr val="FFFFFF"/>
+          </a:solidFill>
+          <a:ln>
+            <a:noFill/>
+          </a:ln>
+        </p:spPr>
+        <p:style>
+          <a:lnRef idx="2">
+            <a:schemeClr val="accent1">
+              <a:shade val="50000"/>
+            </a:schemeClr>
+          </a:lnRef>
+          <a:fillRef idx="1">
+            <a:schemeClr val="accent1"/>
+          </a:fillRef>
+          <a:effectRef idx="0">
+            <a:schemeClr val="accent1"/>
+          </a:effectRef>
+          <a:fontRef idx="minor">
+            <a:schemeClr val="lt1"/>
+          </a:fontRef>
+        </p:style>
+        <p:txBody>
+          <a:bodyPr rtlCol="0" anchor="ctr"/>
+          <a:lstStyle/>
+          <a:p>
+            <a:pPr algn="ctr"/>
+            <a:endParaRPr lang="en-US"/>
+          </a:p>
+        </p:txBody>
+      </p:sp>
+      <p:pic>
+        <p:nvPicPr>
+          <p:cNvPr id="8" name="Imagen 7">
+            <a:extLst>
+              <a:ext uri="{FF2B5EF4-FFF2-40B4-BE49-F238E27FC236}">
+                <a16:creationId xmlns:a16="http://schemas.microsoft.com/office/drawing/2014/main" id="{7180073E-0CFD-4609-BB50-C92A5710FC44}"/>
+              </a:ext>
+            </a:extLst>
+          </p:cNvPr>
+          <p:cNvPicPr>
+            <a:picLocks noChangeAspect="1"/>
+          </p:cNvPicPr>
+          <p:nvPr/>
+        </p:nvPicPr>
+        <p:blipFill>
+          <a:blip r:embed="rId2">
+            <a:extLst>
+              <a:ext uri="{28A0092B-C50C-407E-A947-70E740481C1C}">
+                <a14:useLocalDpi xmlns:a14="http://schemas.microsoft.com/office/drawing/2010/main" val="0"/>
+              </a:ext>
+            </a:extLst>
+          </a:blip>
+          <a:stretch>
+            <a:fillRect/>
+          </a:stretch>
+        </p:blipFill>
+        <p:spPr>
+          <a:xfrm>
+            <a:off x="1120477" y="2060733"/>
+            <a:ext cx="9951041" cy="2736535"/>
+          </a:xfrm>
+          <a:prstGeom prst="rect">
+            <a:avLst/>
+          </a:prstGeom>
+        </p:spPr>
+      </p:pic>
+      <p:pic>
+        <p:nvPicPr>
+          <p:cNvPr id="7" name="Imagen 6">
+            <a:extLst>
+              <a:ext uri="{FF2B5EF4-FFF2-40B4-BE49-F238E27FC236}">
+                <a16:creationId xmlns:a16="http://schemas.microsoft.com/office/drawing/2014/main" id="{002E9A04-5DDC-4FB5-BAA9-B52FDF9BEF2D}"/>
+              </a:ext>
+            </a:extLst>
+          </p:cNvPr>
+          <p:cNvPicPr>
+            <a:picLocks noChangeAspect="1"/>
+          </p:cNvPicPr>
+          <p:nvPr/>
+        </p:nvPicPr>
+        <p:blipFill>
+          <a:blip r:embed="rId3">
+            <a:extLst>
+              <a:ext uri="{28A0092B-C50C-407E-A947-70E740481C1C}">
+                <a14:useLocalDpi xmlns:a14="http://schemas.microsoft.com/office/drawing/2010/main" val="0"/>
+              </a:ext>
+            </a:extLst>
+          </a:blip>
+          <a:stretch>
+            <a:fillRect/>
+          </a:stretch>
+        </p:blipFill>
+        <p:spPr>
+          <a:xfrm>
+            <a:off x="10561927" y="37057"/>
+            <a:ext cx="1520364" cy="457297"/>
+          </a:xfrm>
+          <a:prstGeom prst="rect">
+            <a:avLst/>
+          </a:prstGeom>
+        </p:spPr>
+      </p:pic>
+    </p:spTree>
+    <p:extLst>
+      <p:ext uri="{BB962C8B-B14F-4D97-AF65-F5344CB8AC3E}">
+        <p14:creationId xmlns:p14="http://schemas.microsoft.com/office/powerpoint/2010/main" val="1117142116"/>
+      </p:ext>
+    </p:extLst>
+  </p:cSld>
+  <p:clrMapOvr>
+    <a:masterClrMapping/>
+  </p:clrMapOvr>
+</p:sld>
+</file>
+
+<file path=ppt/slides/slide11.xml><?xml version="1.0" encoding="utf-8"?>
+<p:sld xmlns:a="http://schemas.openxmlformats.org/drawingml/2006/main" xmlns:r="http://schemas.openxmlformats.org/officeDocument/2006/relationships" xmlns:p="http://schemas.openxmlformats.org/presentationml/2006/main">
+  <p:cSld>
+    <p:bg>
+      <p:bgPr>
+        <a:solidFill>
+          <a:schemeClr val="bg1"/>
+        </a:solidFill>
+        <a:effectLst/>
+      </p:bgPr>
+    </p:bg>
+    <p:spTree>
+      <p:nvGrpSpPr>
+        <p:cNvPr id="1" name=""/>
+        <p:cNvGrpSpPr/>
+        <p:nvPr/>
+      </p:nvGrpSpPr>
+      <p:grpSpPr>
+        <a:xfrm>
+          <a:off x="0" y="0"/>
+          <a:ext cx="0" cy="0"/>
+          <a:chOff x="0" y="0"/>
+          <a:chExt cx="0" cy="0"/>
+        </a:xfrm>
+      </p:grpSpPr>
+      <p:sp>
+        <p:nvSpPr>
+          <p:cNvPr id="10" name="Rectangle 12">
+            <a:extLst>
+              <a:ext uri="{FF2B5EF4-FFF2-40B4-BE49-F238E27FC236}">
+                <a16:creationId xmlns:a16="http://schemas.microsoft.com/office/drawing/2014/main" id="{B9FF99BD-075F-4761-A995-6FC574BD25EA}"/>
+              </a:ext>
+              <a:ext uri="{C183D7F6-B498-43B3-948B-1728B52AA6E4}">
+                <adec:decorative xmlns="" xmlns:adec="http://schemas.microsoft.com/office/drawing/2017/decorative" val="1"/>
+              </a:ext>
+            </a:extLst>
+          </p:cNvPr>
+          <p:cNvSpPr>
+            <a:spLocks noGrp="1" noRot="1" noChangeAspect="1" noMove="1" noResize="1" noEditPoints="1" noAdjustHandles="1" noChangeArrowheads="1" noChangeShapeType="1" noTextEdit="1"/>
+          </p:cNvSpPr>
+          <p:nvPr>
+            <p:extLst>
+              <p:ext uri="{386F3935-93C4-4BCD-93E2-E3B085C9AB24}">
+                <p16:designElem xmlns:p16="http://schemas.microsoft.com/office/powerpoint/2015/main" val="1"/>
+              </p:ext>
+            </p:extLst>
+          </p:nvPr>
+        </p:nvSpPr>
+        <p:spPr>
+          <a:xfrm>
+            <a:off x="0" y="0"/>
+            <a:ext cx="12192000" cy="6858000"/>
+          </a:xfrm>
+          <a:prstGeom prst="rect">
+            <a:avLst/>
+          </a:prstGeom>
+          <a:solidFill>
+            <a:schemeClr val="bg1">
+              <a:lumMod val="65000"/>
+            </a:schemeClr>
+          </a:solidFill>
+          <a:ln>
+            <a:noFill/>
+          </a:ln>
+        </p:spPr>
+        <p:style>
+          <a:lnRef idx="2">
+            <a:schemeClr val="accent1">
+              <a:shade val="50000"/>
+            </a:schemeClr>
+          </a:lnRef>
+          <a:fillRef idx="1">
+            <a:schemeClr val="accent1"/>
+          </a:fillRef>
+          <a:effectRef idx="0">
+            <a:schemeClr val="accent1"/>
+          </a:effectRef>
+          <a:fontRef idx="minor">
+            <a:schemeClr val="lt1"/>
+          </a:fontRef>
+        </p:style>
+        <p:txBody>
+          <a:bodyPr rtlCol="0" anchor="ctr"/>
+          <a:lstStyle/>
+          <a:p>
+            <a:pPr algn="ctr"/>
+            <a:endParaRPr lang="en-US"/>
+          </a:p>
+        </p:txBody>
+      </p:sp>
+      <p:sp>
+        <p:nvSpPr>
+          <p:cNvPr id="15" name="Rectangle 14">
+            <a:extLst>
+              <a:ext uri="{FF2B5EF4-FFF2-40B4-BE49-F238E27FC236}">
+                <a16:creationId xmlns:a16="http://schemas.microsoft.com/office/drawing/2014/main" id="{A7B21A54-9BA3-4EA9-B460-5A829ADD9051}"/>
+              </a:ext>
+              <a:ext uri="{C183D7F6-B498-43B3-948B-1728B52AA6E4}">
+                <adec:decorative xmlns="" xmlns:adec="http://schemas.microsoft.com/office/drawing/2017/decorative" val="1"/>
+              </a:ext>
+            </a:extLst>
+          </p:cNvPr>
+          <p:cNvSpPr>
+            <a:spLocks noGrp="1" noRot="1" noChangeAspect="1" noMove="1" noResize="1" noEditPoints="1" noAdjustHandles="1" noChangeArrowheads="1" noChangeShapeType="1" noTextEdit="1"/>
+          </p:cNvSpPr>
+          <p:nvPr>
+            <p:extLst>
+              <p:ext uri="{386F3935-93C4-4BCD-93E2-E3B085C9AB24}">
+                <p16:designElem xmlns:p16="http://schemas.microsoft.com/office/powerpoint/2015/main" val="1"/>
+              </p:ext>
+            </p:extLst>
+          </p:nvPr>
+        </p:nvSpPr>
+        <p:spPr>
+          <a:xfrm>
+            <a:off x="477012" y="480060"/>
+            <a:ext cx="11237976" cy="5897880"/>
+          </a:xfrm>
+          <a:prstGeom prst="rect">
+            <a:avLst/>
+          </a:prstGeom>
+          <a:noFill/>
+          <a:ln>
+            <a:solidFill>
+              <a:schemeClr val="bg1"/>
+            </a:solidFill>
+          </a:ln>
+        </p:spPr>
+        <p:style>
+          <a:lnRef idx="2">
+            <a:schemeClr val="accent1">
+              <a:shade val="50000"/>
+            </a:schemeClr>
+          </a:lnRef>
+          <a:fillRef idx="1">
+            <a:schemeClr val="accent1"/>
+          </a:fillRef>
+          <a:effectRef idx="0">
+            <a:schemeClr val="accent1"/>
+          </a:effectRef>
+          <a:fontRef idx="minor">
+            <a:schemeClr val="lt1"/>
+          </a:fontRef>
+        </p:style>
+        <p:txBody>
+          <a:bodyPr rtlCol="0" anchor="ctr"/>
+          <a:lstStyle/>
+          <a:p>
+            <a:pPr algn="ctr"/>
+            <a:endParaRPr lang="en-US"/>
+          </a:p>
+        </p:txBody>
+      </p:sp>
+      <p:sp>
+        <p:nvSpPr>
+          <p:cNvPr id="17" name="Rectangle 16">
+            <a:extLst>
+              <a:ext uri="{FF2B5EF4-FFF2-40B4-BE49-F238E27FC236}">
+                <a16:creationId xmlns:a16="http://schemas.microsoft.com/office/drawing/2014/main" id="{6FA8F714-B9D8-488A-8CCA-E9948FF913A9}"/>
+              </a:ext>
+              <a:ext uri="{C183D7F6-B498-43B3-948B-1728B52AA6E4}">
+                <adec:decorative xmlns="" xmlns:adec="http://schemas.microsoft.com/office/drawing/2017/decorative" val="1"/>
+              </a:ext>
+            </a:extLst>
+          </p:cNvPr>
+          <p:cNvSpPr>
+            <a:spLocks noGrp="1" noRot="1" noChangeAspect="1" noMove="1" noResize="1" noEditPoints="1" noAdjustHandles="1" noChangeArrowheads="1" noChangeShapeType="1" noTextEdit="1"/>
+          </p:cNvSpPr>
+          <p:nvPr>
+            <p:extLst>
+              <p:ext uri="{386F3935-93C4-4BCD-93E2-E3B085C9AB24}">
+                <p16:designElem xmlns:p16="http://schemas.microsoft.com/office/powerpoint/2015/main" val="1"/>
+              </p:ext>
+            </p:extLst>
+          </p:nvPr>
+        </p:nvSpPr>
+        <p:spPr>
+          <a:xfrm>
+            <a:off x="643466" y="643468"/>
+            <a:ext cx="10905067" cy="5571066"/>
+          </a:xfrm>
+          <a:prstGeom prst="rect">
+            <a:avLst/>
+          </a:prstGeom>
+          <a:solidFill>
+            <a:srgbClr val="FFFFFF"/>
+          </a:solidFill>
+          <a:ln>
+            <a:noFill/>
+          </a:ln>
+        </p:spPr>
+        <p:style>
+          <a:lnRef idx="2">
+            <a:schemeClr val="accent1">
+              <a:shade val="50000"/>
+            </a:schemeClr>
+          </a:lnRef>
+          <a:fillRef idx="1">
+            <a:schemeClr val="accent1"/>
+          </a:fillRef>
+          <a:effectRef idx="0">
+            <a:schemeClr val="accent1"/>
+          </a:effectRef>
+          <a:fontRef idx="minor">
+            <a:schemeClr val="lt1"/>
+          </a:fontRef>
+        </p:style>
+        <p:txBody>
+          <a:bodyPr rtlCol="0" anchor="ctr"/>
+          <a:lstStyle/>
+          <a:p>
+            <a:pPr algn="ctr"/>
+            <a:endParaRPr lang="en-US"/>
+          </a:p>
+        </p:txBody>
+      </p:sp>
+      <p:pic>
+        <p:nvPicPr>
+          <p:cNvPr id="7" name="Imagen 6">
+            <a:extLst>
+              <a:ext uri="{FF2B5EF4-FFF2-40B4-BE49-F238E27FC236}">
+                <a16:creationId xmlns:a16="http://schemas.microsoft.com/office/drawing/2014/main" id="{002E9A04-5DDC-4FB5-BAA9-B52FDF9BEF2D}"/>
+              </a:ext>
+            </a:extLst>
+          </p:cNvPr>
+          <p:cNvPicPr>
+            <a:picLocks noChangeAspect="1"/>
+          </p:cNvPicPr>
+          <p:nvPr/>
+        </p:nvPicPr>
+        <p:blipFill>
+          <a:blip r:embed="rId2">
+            <a:extLst>
+              <a:ext uri="{28A0092B-C50C-407E-A947-70E740481C1C}">
+                <a14:useLocalDpi xmlns:a14="http://schemas.microsoft.com/office/drawing/2010/main" val="0"/>
+              </a:ext>
+            </a:extLst>
+          </a:blip>
+          <a:stretch>
+            <a:fillRect/>
+          </a:stretch>
+        </p:blipFill>
+        <p:spPr>
+          <a:xfrm>
+            <a:off x="10461259" y="0"/>
+            <a:ext cx="1520364" cy="457297"/>
+          </a:xfrm>
+          <a:prstGeom prst="rect">
+            <a:avLst/>
+          </a:prstGeom>
+        </p:spPr>
+      </p:pic>
+      <p:grpSp>
+        <p:nvGrpSpPr>
+          <p:cNvPr id="9" name="Grupo 8">
+            <a:extLst>
+              <a:ext uri="{FF2B5EF4-FFF2-40B4-BE49-F238E27FC236}">
+                <a16:creationId xmlns:a16="http://schemas.microsoft.com/office/drawing/2014/main" id="{350987E9-200C-4786-B1C6-9F11A6F8E491}"/>
+              </a:ext>
+            </a:extLst>
+          </p:cNvPr>
+          <p:cNvGrpSpPr/>
+          <p:nvPr/>
+        </p:nvGrpSpPr>
+        <p:grpSpPr>
+          <a:xfrm>
+            <a:off x="643466" y="1717555"/>
+            <a:ext cx="10903636" cy="3481432"/>
+            <a:chOff x="3051155" y="3049748"/>
+            <a:chExt cx="8467467" cy="2366792"/>
+          </a:xfrm>
+        </p:grpSpPr>
+        <p:pic>
+          <p:nvPicPr>
+            <p:cNvPr id="11" name="Imagen 10">
+              <a:extLst>
+                <a:ext uri="{FF2B5EF4-FFF2-40B4-BE49-F238E27FC236}">
+                  <a16:creationId xmlns:a16="http://schemas.microsoft.com/office/drawing/2014/main" id="{E3010352-24C2-46EF-BF72-35A4928C76C0}"/>
+                </a:ext>
+              </a:extLst>
+            </p:cNvPr>
+            <p:cNvPicPr>
+              <a:picLocks noChangeAspect="1"/>
+            </p:cNvPicPr>
+            <p:nvPr/>
+          </p:nvPicPr>
+          <p:blipFill>
+            <a:blip r:embed="rId3">
+              <a:extLst>
+                <a:ext uri="{28A0092B-C50C-407E-A947-70E740481C1C}">
+                  <a14:useLocalDpi xmlns:a14="http://schemas.microsoft.com/office/drawing/2010/main" val="0"/>
+                </a:ext>
+              </a:extLst>
+            </a:blip>
+            <a:stretch>
+              <a:fillRect/>
+            </a:stretch>
+          </p:blipFill>
+          <p:spPr>
+            <a:xfrm>
+              <a:off x="3051155" y="3049748"/>
+              <a:ext cx="4733982" cy="1230835"/>
+            </a:xfrm>
+            <a:prstGeom prst="rect">
+              <a:avLst/>
+            </a:prstGeom>
+          </p:spPr>
+        </p:pic>
+        <p:pic>
+          <p:nvPicPr>
+            <p:cNvPr id="12" name="Imagen 11">
+              <a:extLst>
+                <a:ext uri="{FF2B5EF4-FFF2-40B4-BE49-F238E27FC236}">
+                  <a16:creationId xmlns:a16="http://schemas.microsoft.com/office/drawing/2014/main" id="{DF2474FA-ADBF-4EE2-9FE5-E2C1ABE3B170}"/>
+                </a:ext>
+              </a:extLst>
+            </p:cNvPr>
+            <p:cNvPicPr>
+              <a:picLocks noChangeAspect="1"/>
+            </p:cNvPicPr>
+            <p:nvPr/>
+          </p:nvPicPr>
+          <p:blipFill>
+            <a:blip r:embed="rId4">
+              <a:extLst>
+                <a:ext uri="{28A0092B-C50C-407E-A947-70E740481C1C}">
+                  <a14:useLocalDpi xmlns:a14="http://schemas.microsoft.com/office/drawing/2010/main" val="0"/>
+                </a:ext>
+              </a:extLst>
+            </a:blip>
+            <a:stretch>
+              <a:fillRect/>
+            </a:stretch>
+          </p:blipFill>
+          <p:spPr>
+            <a:xfrm>
+              <a:off x="3051155" y="4339560"/>
+              <a:ext cx="4733982" cy="1076980"/>
+            </a:xfrm>
+            <a:prstGeom prst="rect">
+              <a:avLst/>
+            </a:prstGeom>
+          </p:spPr>
+        </p:pic>
+        <p:pic>
+          <p:nvPicPr>
+            <p:cNvPr id="13" name="Imagen 12">
+              <a:extLst>
+                <a:ext uri="{FF2B5EF4-FFF2-40B4-BE49-F238E27FC236}">
+                  <a16:creationId xmlns:a16="http://schemas.microsoft.com/office/drawing/2014/main" id="{CFF97DCE-D5BE-41C7-A4EE-F1590F6FF18B}"/>
+                </a:ext>
+              </a:extLst>
+            </p:cNvPr>
+            <p:cNvPicPr>
+              <a:picLocks noChangeAspect="1"/>
+            </p:cNvPicPr>
+            <p:nvPr/>
+          </p:nvPicPr>
+          <p:blipFill>
+            <a:blip r:embed="rId5">
+              <a:extLst>
+                <a:ext uri="{28A0092B-C50C-407E-A947-70E740481C1C}">
+                  <a14:useLocalDpi xmlns:a14="http://schemas.microsoft.com/office/drawing/2010/main" val="0"/>
+                </a:ext>
+              </a:extLst>
+            </a:blip>
+            <a:stretch>
+              <a:fillRect/>
+            </a:stretch>
+          </p:blipFill>
+          <p:spPr>
+            <a:xfrm>
+              <a:off x="7863345" y="3049748"/>
+              <a:ext cx="3655277" cy="2366792"/>
+            </a:xfrm>
+            <a:prstGeom prst="rect">
+              <a:avLst/>
+            </a:prstGeom>
+          </p:spPr>
+        </p:pic>
+      </p:grpSp>
+    </p:spTree>
+    <p:extLst>
+      <p:ext uri="{BB962C8B-B14F-4D97-AF65-F5344CB8AC3E}">
+        <p14:creationId xmlns:p14="http://schemas.microsoft.com/office/powerpoint/2010/main" val="1038434388"/>
+      </p:ext>
+    </p:extLst>
+  </p:cSld>
+  <p:clrMapOvr>
+    <a:masterClrMapping/>
+  </p:clrMapOvr>
+</p:sld>
+</file>
+
+<file path=ppt/slides/slide12.xml><?xml version="1.0" encoding="utf-8"?>
+<p:sld xmlns:a="http://schemas.openxmlformats.org/drawingml/2006/main" xmlns:r="http://schemas.openxmlformats.org/officeDocument/2006/relationships" xmlns:p="http://schemas.openxmlformats.org/presentationml/2006/main">
+  <p:cSld>
+    <p:spTree>
+      <p:nvGrpSpPr>
+        <p:cNvPr id="1" name=""/>
+        <p:cNvGrpSpPr/>
+        <p:nvPr/>
+      </p:nvGrpSpPr>
+      <p:grpSpPr>
+        <a:xfrm>
+          <a:off x="0" y="0"/>
+          <a:ext cx="0" cy="0"/>
+          <a:chOff x="0" y="0"/>
+          <a:chExt cx="0" cy="0"/>
+        </a:xfrm>
+      </p:grpSpPr>
+      <p:pic>
+        <p:nvPicPr>
+          <p:cNvPr id="7" name="Imagen 6">
+            <a:extLst>
+              <a:ext uri="{FF2B5EF4-FFF2-40B4-BE49-F238E27FC236}">
+                <a16:creationId xmlns:a16="http://schemas.microsoft.com/office/drawing/2014/main" id="{002E9A04-5DDC-4FB5-BAA9-B52FDF9BEF2D}"/>
+              </a:ext>
+            </a:extLst>
+          </p:cNvPr>
+          <p:cNvPicPr>
+            <a:picLocks noChangeAspect="1"/>
+          </p:cNvPicPr>
+          <p:nvPr/>
+        </p:nvPicPr>
+        <p:blipFill>
+          <a:blip r:embed="rId2">
+            <a:extLst>
+              <a:ext uri="{28A0092B-C50C-407E-A947-70E740481C1C}">
+                <a14:useLocalDpi xmlns:a14="http://schemas.microsoft.com/office/drawing/2010/main" val="0"/>
+              </a:ext>
+            </a:extLst>
+          </a:blip>
+          <a:stretch>
+            <a:fillRect/>
+          </a:stretch>
+        </p:blipFill>
+        <p:spPr>
+          <a:xfrm>
+            <a:off x="10285090" y="416510"/>
+            <a:ext cx="1520364" cy="457297"/>
+          </a:xfrm>
+          <a:prstGeom prst="rect">
+            <a:avLst/>
+          </a:prstGeom>
+        </p:spPr>
+      </p:pic>
+      <p:sp>
+        <p:nvSpPr>
+          <p:cNvPr id="2" name="Título 1">
+            <a:extLst>
+              <a:ext uri="{FF2B5EF4-FFF2-40B4-BE49-F238E27FC236}">
+                <a16:creationId xmlns:a16="http://schemas.microsoft.com/office/drawing/2014/main" id="{5C54A6E8-65E2-4285-8572-C5EBE11045E6}"/>
+              </a:ext>
+            </a:extLst>
+          </p:cNvPr>
+          <p:cNvSpPr>
+            <a:spLocks noGrp="1"/>
+          </p:cNvSpPr>
+          <p:nvPr>
+            <p:ph type="title"/>
+          </p:nvPr>
+        </p:nvSpPr>
+        <p:spPr>
+          <a:xfrm>
+            <a:off x="0" y="286603"/>
+            <a:ext cx="11155680" cy="1559130"/>
+          </a:xfrm>
+        </p:spPr>
+        <p:txBody>
+          <a:bodyPr anchor="ctr">
+            <a:normAutofit/>
+          </a:bodyPr>
+          <a:lstStyle/>
+          <a:p>
+            <a:pPr algn="ctr"/>
+            <a:r>
+              <a:rPr lang="ca-ES" sz="7400" dirty="0"/>
+              <a:t>RESULTATS</a:t>
+            </a:r>
+          </a:p>
+        </p:txBody>
+      </p:sp>
+      <p:sp>
+        <p:nvSpPr>
+          <p:cNvPr id="3" name="Subtítulo 2">
+            <a:extLst>
+              <a:ext uri="{FF2B5EF4-FFF2-40B4-BE49-F238E27FC236}">
+                <a16:creationId xmlns:a16="http://schemas.microsoft.com/office/drawing/2014/main" id="{A66CE473-CC5F-45CD-A616-C825057A8852}"/>
+              </a:ext>
+            </a:extLst>
+          </p:cNvPr>
+          <p:cNvSpPr>
+            <a:spLocks noGrp="1"/>
+          </p:cNvSpPr>
+          <p:nvPr>
+            <p:ph idx="1"/>
+          </p:nvPr>
+        </p:nvSpPr>
+        <p:spPr>
+          <a:xfrm>
+            <a:off x="1097280" y="1602452"/>
+            <a:ext cx="10058400" cy="4462787"/>
+          </a:xfrm>
+        </p:spPr>
+        <p:txBody>
+          <a:bodyPr anchor="ctr">
+            <a:normAutofit/>
+          </a:bodyPr>
+          <a:lstStyle/>
+          <a:p>
+            <a:pPr>
+              <a:buFont typeface="Courier New" panose="02070309020205020404" pitchFamily="49" charset="0"/>
+              <a:buChar char="o"/>
+            </a:pPr>
+            <a:r>
+              <a:rPr lang="ca-ES" sz="2400" dirty="0"/>
+              <a:t> Qualitat dels resultats</a:t>
+            </a:r>
+          </a:p>
+          <a:p>
+            <a:pPr>
+              <a:buFont typeface="Courier New" panose="02070309020205020404" pitchFamily="49" charset="0"/>
+              <a:buChar char="o"/>
+            </a:pPr>
+            <a:endParaRPr lang="ca-ES" sz="2400" dirty="0"/>
+          </a:p>
+          <a:p>
+            <a:pPr>
+              <a:buFont typeface="Courier New" panose="02070309020205020404" pitchFamily="49" charset="0"/>
+              <a:buChar char="o"/>
+            </a:pPr>
+            <a:r>
+              <a:rPr lang="ca-ES" sz="2400" dirty="0"/>
+              <a:t> Possibles problemes</a:t>
+            </a:r>
+          </a:p>
+          <a:p>
+            <a:pPr lvl="2">
+              <a:buFont typeface="Courier New" panose="02070309020205020404" pitchFamily="49" charset="0"/>
+              <a:buChar char="o"/>
+            </a:pPr>
+            <a:r>
+              <a:rPr lang="ca-ES" sz="1800" dirty="0"/>
+              <a:t>Dades escasses</a:t>
+            </a:r>
+          </a:p>
+          <a:p>
+            <a:pPr lvl="2">
+              <a:buFont typeface="Courier New" panose="02070309020205020404" pitchFamily="49" charset="0"/>
+              <a:buChar char="o"/>
+            </a:pPr>
+            <a:r>
+              <a:rPr lang="ca-ES" sz="1800" dirty="0"/>
+              <a:t>Filtratge</a:t>
+            </a:r>
+          </a:p>
+          <a:p>
+            <a:pPr lvl="2">
+              <a:buFont typeface="Courier New" panose="02070309020205020404" pitchFamily="49" charset="0"/>
+              <a:buChar char="o"/>
+            </a:pPr>
+            <a:r>
+              <a:rPr lang="ca-ES" sz="1800" dirty="0"/>
+              <a:t>Format de les dades</a:t>
+            </a:r>
+          </a:p>
+          <a:p>
+            <a:pPr lvl="2">
+              <a:buFont typeface="Courier New" panose="02070309020205020404" pitchFamily="49" charset="0"/>
+              <a:buChar char="o"/>
+            </a:pPr>
+            <a:r>
+              <a:rPr lang="ca-ES" sz="1800" dirty="0"/>
+              <a:t>Relació de colors</a:t>
+            </a:r>
+          </a:p>
+          <a:p>
+            <a:pPr lvl="1">
+              <a:buFont typeface="Courier New" panose="02070309020205020404" pitchFamily="49" charset="0"/>
+              <a:buChar char="o"/>
+            </a:pPr>
+            <a:endParaRPr lang="ca-ES" sz="2200" dirty="0"/>
+          </a:p>
+        </p:txBody>
+      </p:sp>
+    </p:spTree>
+    <p:extLst>
+      <p:ext uri="{BB962C8B-B14F-4D97-AF65-F5344CB8AC3E}">
+        <p14:creationId xmlns:p14="http://schemas.microsoft.com/office/powerpoint/2010/main" val="3058950158"/>
+      </p:ext>
+    </p:extLst>
+  </p:cSld>
+  <p:clrMapOvr>
+    <a:masterClrMapping/>
+  </p:clrMapOvr>
+</p:sld>
+</file>
+
+<file path=ppt/slides/slide13.xml><?xml version="1.0" encoding="utf-8"?>
+<p:sld xmlns:a="http://schemas.openxmlformats.org/drawingml/2006/main" xmlns:r="http://schemas.openxmlformats.org/officeDocument/2006/relationships" xmlns:p="http://schemas.openxmlformats.org/presentationml/2006/main">
+  <p:cSld>
+    <p:spTree>
+      <p:nvGrpSpPr>
+        <p:cNvPr id="1" name=""/>
+        <p:cNvGrpSpPr/>
+        <p:nvPr/>
+      </p:nvGrpSpPr>
+      <p:grpSpPr>
+        <a:xfrm>
+          <a:off x="0" y="0"/>
+          <a:ext cx="0" cy="0"/>
+          <a:chOff x="0" y="0"/>
+          <a:chExt cx="0" cy="0"/>
+        </a:xfrm>
+      </p:grpSpPr>
+      <p:pic>
+        <p:nvPicPr>
+          <p:cNvPr id="7" name="Imagen 6">
+            <a:extLst>
+              <a:ext uri="{FF2B5EF4-FFF2-40B4-BE49-F238E27FC236}">
+                <a16:creationId xmlns:a16="http://schemas.microsoft.com/office/drawing/2014/main" id="{002E9A04-5DDC-4FB5-BAA9-B52FDF9BEF2D}"/>
+              </a:ext>
+            </a:extLst>
+          </p:cNvPr>
+          <p:cNvPicPr>
+            <a:picLocks noChangeAspect="1"/>
+          </p:cNvPicPr>
+          <p:nvPr/>
+        </p:nvPicPr>
+        <p:blipFill>
+          <a:blip r:embed="rId2">
+            <a:extLst>
+              <a:ext uri="{28A0092B-C50C-407E-A947-70E740481C1C}">
+                <a14:useLocalDpi xmlns:a14="http://schemas.microsoft.com/office/drawing/2010/main" val="0"/>
+              </a:ext>
+            </a:extLst>
+          </a:blip>
+          <a:stretch>
+            <a:fillRect/>
+          </a:stretch>
+        </p:blipFill>
+        <p:spPr>
+          <a:xfrm>
+            <a:off x="10285090" y="416510"/>
+            <a:ext cx="1520364" cy="457297"/>
+          </a:xfrm>
+          <a:prstGeom prst="rect">
+            <a:avLst/>
+          </a:prstGeom>
+        </p:spPr>
+      </p:pic>
+      <p:sp>
+        <p:nvSpPr>
+          <p:cNvPr id="2" name="Título 1">
+            <a:extLst>
+              <a:ext uri="{FF2B5EF4-FFF2-40B4-BE49-F238E27FC236}">
+                <a16:creationId xmlns:a16="http://schemas.microsoft.com/office/drawing/2014/main" id="{5C54A6E8-65E2-4285-8572-C5EBE11045E6}"/>
+              </a:ext>
+            </a:extLst>
+          </p:cNvPr>
+          <p:cNvSpPr>
+            <a:spLocks noGrp="1"/>
+          </p:cNvSpPr>
+          <p:nvPr>
+            <p:ph type="title"/>
+          </p:nvPr>
+        </p:nvSpPr>
+        <p:spPr>
+          <a:xfrm>
+            <a:off x="0" y="286603"/>
+            <a:ext cx="11155680" cy="1559130"/>
+          </a:xfrm>
+        </p:spPr>
+        <p:txBody>
+          <a:bodyPr anchor="ctr">
+            <a:normAutofit/>
+          </a:bodyPr>
+          <a:lstStyle/>
+          <a:p>
+            <a:pPr algn="ctr"/>
+            <a:r>
+              <a:rPr lang="ca-ES" sz="7400" dirty="0"/>
+              <a:t>CONCLUSIONS</a:t>
+            </a:r>
+          </a:p>
+        </p:txBody>
+      </p:sp>
+      <p:sp>
+        <p:nvSpPr>
+          <p:cNvPr id="3" name="Subtítulo 2">
+            <a:extLst>
+              <a:ext uri="{FF2B5EF4-FFF2-40B4-BE49-F238E27FC236}">
+                <a16:creationId xmlns:a16="http://schemas.microsoft.com/office/drawing/2014/main" id="{A66CE473-CC5F-45CD-A616-C825057A8852}"/>
+              </a:ext>
+            </a:extLst>
+          </p:cNvPr>
+          <p:cNvSpPr>
+            <a:spLocks noGrp="1"/>
+          </p:cNvSpPr>
+          <p:nvPr>
+            <p:ph idx="1"/>
+          </p:nvPr>
+        </p:nvSpPr>
+        <p:spPr>
+          <a:xfrm>
+            <a:off x="1097280" y="1602452"/>
+            <a:ext cx="10058400" cy="4462787"/>
+          </a:xfrm>
+        </p:spPr>
+        <p:txBody>
+          <a:bodyPr anchor="ctr">
+            <a:normAutofit/>
+          </a:bodyPr>
+          <a:lstStyle/>
+          <a:p>
+            <a:pPr>
+              <a:buFont typeface="Courier New" panose="02070309020205020404" pitchFamily="49" charset="0"/>
+              <a:buChar char="o"/>
+            </a:pPr>
+            <a:r>
+              <a:rPr lang="ca-ES" sz="2400" dirty="0"/>
+              <a:t> Validació de la interfície gràfica</a:t>
+            </a:r>
+          </a:p>
+          <a:p>
+            <a:pPr>
+              <a:buFont typeface="Courier New" panose="02070309020205020404" pitchFamily="49" charset="0"/>
+              <a:buChar char="o"/>
+            </a:pPr>
+            <a:endParaRPr lang="ca-ES" sz="2400" dirty="0"/>
+          </a:p>
+          <a:p>
+            <a:pPr>
+              <a:buFont typeface="Courier New" panose="02070309020205020404" pitchFamily="49" charset="0"/>
+              <a:buChar char="o"/>
+            </a:pPr>
+            <a:r>
+              <a:rPr lang="ca-ES" sz="2400" dirty="0"/>
+              <a:t> Generació de moodboards per part de la RBM</a:t>
+            </a:r>
+          </a:p>
+          <a:p>
+            <a:pPr>
+              <a:buFont typeface="Courier New" panose="02070309020205020404" pitchFamily="49" charset="0"/>
+              <a:buChar char="o"/>
+            </a:pPr>
+            <a:endParaRPr lang="ca-ES" sz="2400" dirty="0"/>
+          </a:p>
+          <a:p>
+            <a:pPr>
+              <a:buFont typeface="Courier New" panose="02070309020205020404" pitchFamily="49" charset="0"/>
+              <a:buChar char="o"/>
+            </a:pPr>
+            <a:r>
+              <a:rPr lang="ca-ES" sz="2200" dirty="0"/>
+              <a:t> Utilitat real de la màquina</a:t>
+            </a:r>
+          </a:p>
+        </p:txBody>
+      </p:sp>
+    </p:spTree>
+    <p:extLst>
+      <p:ext uri="{BB962C8B-B14F-4D97-AF65-F5344CB8AC3E}">
+        <p14:creationId xmlns:p14="http://schemas.microsoft.com/office/powerpoint/2010/main" val="4055323662"/>
+      </p:ext>
+    </p:extLst>
+  </p:cSld>
+  <p:clrMapOvr>
+    <a:masterClrMapping/>
+  </p:clrMapOvr>
+</p:sld>
+</file>
+
+<file path=ppt/slides/slide14.xml><?xml version="1.0" encoding="utf-8"?>
+<p:sld xmlns:a="http://schemas.openxmlformats.org/drawingml/2006/main" xmlns:r="http://schemas.openxmlformats.org/officeDocument/2006/relationships" xmlns:p="http://schemas.openxmlformats.org/presentationml/2006/main">
+  <p:cSld>
+    <p:spTree>
+      <p:nvGrpSpPr>
+        <p:cNvPr id="1" name=""/>
+        <p:cNvGrpSpPr/>
+        <p:nvPr/>
+      </p:nvGrpSpPr>
+      <p:grpSpPr>
+        <a:xfrm>
+          <a:off x="0" y="0"/>
+          <a:ext cx="0" cy="0"/>
+          <a:chOff x="0" y="0"/>
+          <a:chExt cx="0" cy="0"/>
+        </a:xfrm>
+      </p:grpSpPr>
+      <p:pic>
+        <p:nvPicPr>
+          <p:cNvPr id="7" name="Imagen 6">
+            <a:extLst>
+              <a:ext uri="{FF2B5EF4-FFF2-40B4-BE49-F238E27FC236}">
+                <a16:creationId xmlns:a16="http://schemas.microsoft.com/office/drawing/2014/main" id="{002E9A04-5DDC-4FB5-BAA9-B52FDF9BEF2D}"/>
+              </a:ext>
+            </a:extLst>
+          </p:cNvPr>
+          <p:cNvPicPr>
+            <a:picLocks noChangeAspect="1"/>
+          </p:cNvPicPr>
+          <p:nvPr/>
+        </p:nvPicPr>
+        <p:blipFill>
+          <a:blip r:embed="rId2">
+            <a:extLst>
+              <a:ext uri="{28A0092B-C50C-407E-A947-70E740481C1C}">
+                <a14:useLocalDpi xmlns:a14="http://schemas.microsoft.com/office/drawing/2010/main" val="0"/>
+              </a:ext>
+            </a:extLst>
+          </a:blip>
+          <a:stretch>
+            <a:fillRect/>
+          </a:stretch>
+        </p:blipFill>
+        <p:spPr>
+          <a:xfrm>
+            <a:off x="10285090" y="416510"/>
+            <a:ext cx="1520364" cy="457297"/>
+          </a:xfrm>
+          <a:prstGeom prst="rect">
+            <a:avLst/>
+          </a:prstGeom>
+        </p:spPr>
+      </p:pic>
+      <p:sp>
+        <p:nvSpPr>
+          <p:cNvPr id="2" name="Título 1">
+            <a:extLst>
+              <a:ext uri="{FF2B5EF4-FFF2-40B4-BE49-F238E27FC236}">
+                <a16:creationId xmlns:a16="http://schemas.microsoft.com/office/drawing/2014/main" id="{5C54A6E8-65E2-4285-8572-C5EBE11045E6}"/>
+              </a:ext>
+            </a:extLst>
+          </p:cNvPr>
+          <p:cNvSpPr>
+            <a:spLocks noGrp="1"/>
+          </p:cNvSpPr>
+          <p:nvPr>
+            <p:ph type="title"/>
+          </p:nvPr>
+        </p:nvSpPr>
+        <p:spPr>
+          <a:xfrm>
+            <a:off x="0" y="286603"/>
+            <a:ext cx="11155680" cy="1559130"/>
+          </a:xfrm>
+        </p:spPr>
+        <p:txBody>
+          <a:bodyPr anchor="ctr">
+            <a:normAutofit/>
+          </a:bodyPr>
+          <a:lstStyle/>
+          <a:p>
+            <a:pPr algn="ctr"/>
+            <a:r>
+              <a:rPr lang="ca-ES" sz="7400" dirty="0"/>
+              <a:t>ALGUNA PREGUNTA?</a:t>
+            </a:r>
+          </a:p>
+        </p:txBody>
+      </p:sp>
+    </p:spTree>
+    <p:extLst>
+      <p:ext uri="{BB962C8B-B14F-4D97-AF65-F5344CB8AC3E}">
+        <p14:creationId xmlns:p14="http://schemas.microsoft.com/office/powerpoint/2010/main" val="1519546162"/>
+      </p:ext>
+    </p:extLst>
+  </p:cSld>
+  <p:clrMapOvr>
+    <a:masterClrMapping/>
+  </p:clrMapOvr>
+</p:sld>
+</file>
+
+<file path=ppt/slides/slide15.xml><?xml version="1.0" encoding="utf-8"?>
+<p:sld xmlns:a="http://schemas.openxmlformats.org/drawingml/2006/main" xmlns:r="http://schemas.openxmlformats.org/officeDocument/2006/relationships" xmlns:p="http://schemas.openxmlformats.org/presentationml/2006/main">
+  <p:cSld>
+    <p:spTree>
+      <p:nvGrpSpPr>
+        <p:cNvPr id="1" name=""/>
+        <p:cNvGrpSpPr/>
+        <p:nvPr/>
+      </p:nvGrpSpPr>
+      <p:grpSpPr>
+        <a:xfrm>
+          <a:off x="0" y="0"/>
+          <a:ext cx="0" cy="0"/>
+          <a:chOff x="0" y="0"/>
+          <a:chExt cx="0" cy="0"/>
+        </a:xfrm>
+      </p:grpSpPr>
+      <p:pic>
+        <p:nvPicPr>
+          <p:cNvPr id="7" name="Imagen 6">
+            <a:extLst>
+              <a:ext uri="{FF2B5EF4-FFF2-40B4-BE49-F238E27FC236}">
+                <a16:creationId xmlns:a16="http://schemas.microsoft.com/office/drawing/2014/main" id="{002E9A04-5DDC-4FB5-BAA9-B52FDF9BEF2D}"/>
+              </a:ext>
+            </a:extLst>
+          </p:cNvPr>
+          <p:cNvPicPr>
+            <a:picLocks noChangeAspect="1"/>
+          </p:cNvPicPr>
+          <p:nvPr/>
+        </p:nvPicPr>
+        <p:blipFill>
+          <a:blip r:embed="rId2">
+            <a:extLst>
+              <a:ext uri="{28A0092B-C50C-407E-A947-70E740481C1C}">
+                <a14:useLocalDpi xmlns:a14="http://schemas.microsoft.com/office/drawing/2010/main" val="0"/>
+              </a:ext>
+            </a:extLst>
+          </a:blip>
+          <a:stretch>
+            <a:fillRect/>
+          </a:stretch>
+        </p:blipFill>
+        <p:spPr>
+          <a:xfrm>
+            <a:off x="10285090" y="416510"/>
+            <a:ext cx="1520364" cy="457297"/>
+          </a:xfrm>
+          <a:prstGeom prst="rect">
+            <a:avLst/>
+          </a:prstGeom>
+        </p:spPr>
+      </p:pic>
+      <p:sp>
+        <p:nvSpPr>
+          <p:cNvPr id="2" name="Título 1">
+            <a:extLst>
+              <a:ext uri="{FF2B5EF4-FFF2-40B4-BE49-F238E27FC236}">
+                <a16:creationId xmlns:a16="http://schemas.microsoft.com/office/drawing/2014/main" id="{5C54A6E8-65E2-4285-8572-C5EBE11045E6}"/>
+              </a:ext>
+            </a:extLst>
+          </p:cNvPr>
+          <p:cNvSpPr>
+            <a:spLocks noGrp="1"/>
+          </p:cNvSpPr>
+          <p:nvPr>
+            <p:ph type="title"/>
+          </p:nvPr>
+        </p:nvSpPr>
+        <p:spPr>
+          <a:xfrm>
+            <a:off x="0" y="286603"/>
+            <a:ext cx="11155680" cy="1559130"/>
+          </a:xfrm>
+        </p:spPr>
+        <p:txBody>
+          <a:bodyPr anchor="ctr">
+            <a:normAutofit/>
+          </a:bodyPr>
+          <a:lstStyle/>
+          <a:p>
+            <a:pPr algn="ctr"/>
+            <a:r>
+              <a:rPr lang="ca-ES" sz="7400" dirty="0"/>
+              <a:t>AGRAÏMENTS</a:t>
+            </a:r>
+          </a:p>
+        </p:txBody>
+      </p:sp>
+      <p:sp>
+        <p:nvSpPr>
+          <p:cNvPr id="3" name="Subtítulo 2">
+            <a:extLst>
+              <a:ext uri="{FF2B5EF4-FFF2-40B4-BE49-F238E27FC236}">
+                <a16:creationId xmlns:a16="http://schemas.microsoft.com/office/drawing/2014/main" id="{A66CE473-CC5F-45CD-A616-C825057A8852}"/>
+              </a:ext>
+            </a:extLst>
+          </p:cNvPr>
+          <p:cNvSpPr>
+            <a:spLocks noGrp="1"/>
+          </p:cNvSpPr>
+          <p:nvPr>
+            <p:ph idx="1"/>
+          </p:nvPr>
+        </p:nvSpPr>
+        <p:spPr>
+          <a:xfrm>
+            <a:off x="1097280" y="1602452"/>
+            <a:ext cx="10058400" cy="4462787"/>
+          </a:xfrm>
+        </p:spPr>
+        <p:txBody>
+          <a:bodyPr anchor="ctr">
+            <a:normAutofit/>
+          </a:bodyPr>
+          <a:lstStyle/>
+          <a:p>
+            <a:pPr>
+              <a:buFont typeface="Courier New" panose="02070309020205020404" pitchFamily="49" charset="0"/>
+              <a:buChar char="o"/>
+            </a:pPr>
+            <a:r>
+              <a:rPr lang="ca-ES" sz="2400" dirty="0"/>
+              <a:t> David </a:t>
+            </a:r>
+            <a:r>
+              <a:rPr lang="ca-ES" sz="2400" dirty="0" err="1"/>
+              <a:t>Buchaca</a:t>
+            </a:r>
+            <a:r>
+              <a:rPr lang="ca-ES" sz="2400" dirty="0"/>
+              <a:t>, tutor del TFG.</a:t>
+            </a:r>
+          </a:p>
+          <a:p>
+            <a:pPr>
+              <a:buFont typeface="Courier New" panose="02070309020205020404" pitchFamily="49" charset="0"/>
+              <a:buChar char="o"/>
+            </a:pPr>
+            <a:endParaRPr lang="ca-ES" sz="2400" dirty="0"/>
+          </a:p>
+          <a:p>
+            <a:pPr>
+              <a:buFont typeface="Courier New" panose="02070309020205020404" pitchFamily="49" charset="0"/>
+              <a:buChar char="o"/>
+            </a:pPr>
+            <a:r>
+              <a:rPr lang="ca-ES" sz="2400" dirty="0"/>
+              <a:t> David Osuna, tutor a l’empresa</a:t>
+            </a:r>
+          </a:p>
+          <a:p>
+            <a:pPr>
+              <a:buFont typeface="Courier New" panose="02070309020205020404" pitchFamily="49" charset="0"/>
+              <a:buChar char="o"/>
+            </a:pPr>
+            <a:endParaRPr lang="ca-ES" sz="2400" dirty="0"/>
+          </a:p>
+          <a:p>
+            <a:pPr>
+              <a:buFont typeface="Courier New" panose="02070309020205020404" pitchFamily="49" charset="0"/>
+              <a:buChar char="o"/>
+            </a:pPr>
+            <a:r>
+              <a:rPr lang="ca-ES" sz="2200" dirty="0"/>
+              <a:t> </a:t>
+            </a:r>
+            <a:r>
+              <a:rPr lang="ca-ES" sz="2200" dirty="0" err="1"/>
+              <a:t>Interiorvista</a:t>
+            </a:r>
+            <a:r>
+              <a:rPr lang="ca-ES" sz="2200" dirty="0"/>
+              <a:t>, empresa </a:t>
+            </a:r>
+          </a:p>
+        </p:txBody>
+      </p:sp>
+    </p:spTree>
+    <p:extLst>
+      <p:ext uri="{BB962C8B-B14F-4D97-AF65-F5344CB8AC3E}">
+        <p14:creationId xmlns:p14="http://schemas.microsoft.com/office/powerpoint/2010/main" val="3192450463"/>
       </p:ext>
     </p:extLst>
   </p:cSld>
@@ -10651,7 +12036,7 @@
                 <a16:creationId xmlns:a16="http://schemas.microsoft.com/office/drawing/2014/main" id="{A9F529C3-C941-49FD-8C67-82F134F64BDB}"/>
               </a:ext>
               <a:ext uri="{C183D7F6-B498-43B3-948B-1728B52AA6E4}">
-                <adec:decorative xmlns="" xmlns:adec="http://schemas.microsoft.com/office/drawing/2017/decorative" val="1"/>
+                <adec:decorative xmlns:adec="http://schemas.microsoft.com/office/drawing/2017/decorative" xmlns="" val="1"/>
               </a:ext>
             </a:extLst>
           </p:cNvPr>
@@ -10718,7 +12103,7 @@
                 <a16:creationId xmlns:a16="http://schemas.microsoft.com/office/drawing/2014/main" id="{20586029-32A0-47E5-9AEC-AE3ABA6B94D0}"/>
               </a:ext>
               <a:ext uri="{C183D7F6-B498-43B3-948B-1728B52AA6E4}">
-                <adec:decorative xmlns="" xmlns:adec="http://schemas.microsoft.com/office/drawing/2017/decorative" val="1"/>
+                <adec:decorative xmlns:adec="http://schemas.microsoft.com/office/drawing/2017/decorative" xmlns="" val="1"/>
               </a:ext>
             </a:extLst>
           </p:cNvPr>
@@ -10824,7 +12209,7 @@
                 <a16:creationId xmlns:a16="http://schemas.microsoft.com/office/drawing/2014/main" id="{8C730EAB-A532-4295-A302-FB4B90DB9F5E}"/>
               </a:ext>
               <a:ext uri="{C183D7F6-B498-43B3-948B-1728B52AA6E4}">
-                <adec:decorative xmlns="" xmlns:adec="http://schemas.microsoft.com/office/drawing/2017/decorative" val="1"/>
+                <adec:decorative xmlns:adec="http://schemas.microsoft.com/office/drawing/2017/decorative" xmlns="" val="1"/>
               </a:ext>
             </a:extLst>
           </p:cNvPr>
@@ -11037,7 +12422,7 @@
             <a:pPr algn="ctr"/>
             <a:r>
               <a:rPr lang="ca-ES" sz="7400" dirty="0"/>
-              <a:t>RESTRICTED BOLTZMANN MACHINE</a:t>
+              <a:t>RESTRICTED BOLTZMANN MACHINE (RBM)</a:t>
             </a:r>
           </a:p>
         </p:txBody>
@@ -11066,9 +12451,21 @@
         </p:spPr>
         <p:txBody>
           <a:bodyPr anchor="ctr">
-            <a:normAutofit/>
+            <a:normAutofit lnSpcReduction="10000"/>
           </a:bodyPr>
           <a:lstStyle/>
+          <a:p>
+            <a:pPr marL="0" indent="0">
+              <a:buNone/>
+            </a:pPr>
+            <a:endParaRPr lang="ca-ES" sz="2400" dirty="0"/>
+          </a:p>
+          <a:p>
+            <a:pPr marL="0" indent="0">
+              <a:buNone/>
+            </a:pPr>
+            <a:endParaRPr lang="ca-ES" sz="2400" dirty="0"/>
+          </a:p>
           <a:p>
             <a:pPr>
               <a:buFont typeface="Courier New" panose="02070309020205020404" pitchFamily="49" charset="0"/>
@@ -11076,7 +12473,7 @@
             </a:pPr>
             <a:r>
               <a:rPr lang="ca-ES" sz="2400" dirty="0"/>
-              <a:t>Xarxa neuronal</a:t>
+              <a:t>Eines utilitzades</a:t>
             </a:r>
           </a:p>
           <a:p>
@@ -11093,7 +12490,7 @@
             </a:pPr>
             <a:r>
               <a:rPr lang="ca-ES" sz="2400" dirty="0"/>
-              <a:t>Model generatiu</a:t>
+              <a:t>Xarxa Neuronal</a:t>
             </a:r>
           </a:p>
           <a:p>
@@ -11110,8 +12507,32 @@
             </a:pPr>
             <a:r>
               <a:rPr lang="ca-ES" sz="2400" dirty="0"/>
-              <a:t>Eines utilitzades</a:t>
-            </a:r>
+              <a:t>Model generatiu</a:t>
+            </a:r>
+          </a:p>
+          <a:p>
+            <a:pPr>
+              <a:buFont typeface="Courier New" panose="02070309020205020404" pitchFamily="49" charset="0"/>
+              <a:buChar char="o"/>
+            </a:pPr>
+            <a:endParaRPr lang="ca-ES" sz="2400" dirty="0"/>
+          </a:p>
+          <a:p>
+            <a:pPr>
+              <a:buFont typeface="Courier New" panose="02070309020205020404" pitchFamily="49" charset="0"/>
+              <a:buChar char="o"/>
+            </a:pPr>
+            <a:r>
+              <a:rPr lang="ca-ES" sz="2400" dirty="0"/>
+              <a:t>Entrenament</a:t>
+            </a:r>
+          </a:p>
+          <a:p>
+            <a:pPr>
+              <a:buFont typeface="Courier New" panose="02070309020205020404" pitchFamily="49" charset="0"/>
+              <a:buChar char="o"/>
+            </a:pPr>
+            <a:endParaRPr lang="ca-ES" sz="2400" dirty="0"/>
           </a:p>
         </p:txBody>
       </p:sp>
@@ -11146,8 +12567,8 @@
         </p:blipFill>
         <p:spPr>
           <a:xfrm>
-            <a:off x="6391057" y="4892855"/>
-            <a:ext cx="2214780" cy="654173"/>
+            <a:off x="3741413" y="2304182"/>
+            <a:ext cx="1834067" cy="541723"/>
           </a:xfrm>
           <a:prstGeom prst="rect">
             <a:avLst/>
@@ -11182,8 +12603,44 @@
         </p:blipFill>
         <p:spPr>
           <a:xfrm>
-            <a:off x="8852363" y="4765552"/>
-            <a:ext cx="2192909" cy="1181100"/>
+            <a:off x="5664851" y="2030951"/>
+            <a:ext cx="1610185" cy="867245"/>
+          </a:xfrm>
+          <a:prstGeom prst="rect">
+            <a:avLst/>
+          </a:prstGeom>
+        </p:spPr>
+      </p:pic>
+      <p:pic>
+        <p:nvPicPr>
+          <p:cNvPr id="9" name="Imagen 8">
+            <a:extLst>
+              <a:ext uri="{FF2B5EF4-FFF2-40B4-BE49-F238E27FC236}">
+                <a16:creationId xmlns:a16="http://schemas.microsoft.com/office/drawing/2014/main" id="{304EDEE7-A11A-4E21-9565-7D2A1F59DB25}"/>
+              </a:ext>
+            </a:extLst>
+          </p:cNvPr>
+          <p:cNvPicPr>
+            <a:picLocks noChangeAspect="1"/>
+          </p:cNvPicPr>
+          <p:nvPr/>
+        </p:nvPicPr>
+        <p:blipFill>
+          <a:blip r:embed="rId6">
+            <a:extLst>
+              <a:ext uri="{28A0092B-C50C-407E-A947-70E740481C1C}">
+                <a14:useLocalDpi xmlns:a14="http://schemas.microsoft.com/office/drawing/2010/main" val="0"/>
+              </a:ext>
+            </a:extLst>
+          </a:blip>
+          <a:stretch>
+            <a:fillRect/>
+          </a:stretch>
+        </p:blipFill>
+        <p:spPr>
+          <a:xfrm>
+            <a:off x="3696987" y="3304355"/>
+            <a:ext cx="3756986" cy="899238"/>
           </a:xfrm>
           <a:prstGeom prst="rect">
             <a:avLst/>
@@ -11194,6 +12651,372 @@
     <p:extLst>
       <p:ext uri="{BB962C8B-B14F-4D97-AF65-F5344CB8AC3E}">
         <p14:creationId xmlns:p14="http://schemas.microsoft.com/office/powerpoint/2010/main" val="3591112909"/>
+      </p:ext>
+    </p:extLst>
+  </p:cSld>
+  <p:clrMapOvr>
+    <a:masterClrMapping/>
+  </p:clrMapOvr>
+</p:sld>
+</file>
+
+<file path=ppt/slides/slide8.xml><?xml version="1.0" encoding="utf-8"?>
+<p:sld xmlns:a="http://schemas.openxmlformats.org/drawingml/2006/main" xmlns:r="http://schemas.openxmlformats.org/officeDocument/2006/relationships" xmlns:p="http://schemas.openxmlformats.org/presentationml/2006/main">
+  <p:cSld>
+    <p:spTree>
+      <p:nvGrpSpPr>
+        <p:cNvPr id="1" name=""/>
+        <p:cNvGrpSpPr/>
+        <p:nvPr/>
+      </p:nvGrpSpPr>
+      <p:grpSpPr>
+        <a:xfrm>
+          <a:off x="0" y="0"/>
+          <a:ext cx="0" cy="0"/>
+          <a:chOff x="0" y="0"/>
+          <a:chExt cx="0" cy="0"/>
+        </a:xfrm>
+      </p:grpSpPr>
+      <p:pic>
+        <p:nvPicPr>
+          <p:cNvPr id="7" name="Imagen 6">
+            <a:extLst>
+              <a:ext uri="{FF2B5EF4-FFF2-40B4-BE49-F238E27FC236}">
+                <a16:creationId xmlns:a16="http://schemas.microsoft.com/office/drawing/2014/main" id="{002E9A04-5DDC-4FB5-BAA9-B52FDF9BEF2D}"/>
+              </a:ext>
+            </a:extLst>
+          </p:cNvPr>
+          <p:cNvPicPr>
+            <a:picLocks noChangeAspect="1"/>
+          </p:cNvPicPr>
+          <p:nvPr/>
+        </p:nvPicPr>
+        <p:blipFill>
+          <a:blip r:embed="rId2">
+            <a:extLst>
+              <a:ext uri="{28A0092B-C50C-407E-A947-70E740481C1C}">
+                <a14:useLocalDpi xmlns:a14="http://schemas.microsoft.com/office/drawing/2010/main" val="0"/>
+              </a:ext>
+            </a:extLst>
+          </a:blip>
+          <a:stretch>
+            <a:fillRect/>
+          </a:stretch>
+        </p:blipFill>
+        <p:spPr>
+          <a:xfrm>
+            <a:off x="10285090" y="416510"/>
+            <a:ext cx="1520364" cy="457297"/>
+          </a:xfrm>
+          <a:prstGeom prst="rect">
+            <a:avLst/>
+          </a:prstGeom>
+        </p:spPr>
+      </p:pic>
+      <p:sp>
+        <p:nvSpPr>
+          <p:cNvPr id="2" name="Título 1">
+            <a:extLst>
+              <a:ext uri="{FF2B5EF4-FFF2-40B4-BE49-F238E27FC236}">
+                <a16:creationId xmlns:a16="http://schemas.microsoft.com/office/drawing/2014/main" id="{5C54A6E8-65E2-4285-8572-C5EBE11045E6}"/>
+              </a:ext>
+            </a:extLst>
+          </p:cNvPr>
+          <p:cNvSpPr>
+            <a:spLocks noGrp="1"/>
+          </p:cNvSpPr>
+          <p:nvPr>
+            <p:ph type="title"/>
+          </p:nvPr>
+        </p:nvSpPr>
+        <p:spPr>
+          <a:xfrm>
+            <a:off x="0" y="286603"/>
+            <a:ext cx="11155680" cy="1559130"/>
+          </a:xfrm>
+        </p:spPr>
+        <p:txBody>
+          <a:bodyPr anchor="ctr">
+            <a:normAutofit/>
+          </a:bodyPr>
+          <a:lstStyle/>
+          <a:p>
+            <a:pPr algn="ctr"/>
+            <a:r>
+              <a:rPr lang="ca-ES" sz="7400" dirty="0"/>
+              <a:t>DADES</a:t>
+            </a:r>
+          </a:p>
+        </p:txBody>
+      </p:sp>
+      <p:sp>
+        <p:nvSpPr>
+          <p:cNvPr id="3" name="Subtítulo 2">
+            <a:extLst>
+              <a:ext uri="{FF2B5EF4-FFF2-40B4-BE49-F238E27FC236}">
+                <a16:creationId xmlns:a16="http://schemas.microsoft.com/office/drawing/2014/main" id="{A66CE473-CC5F-45CD-A616-C825057A8852}"/>
+              </a:ext>
+            </a:extLst>
+          </p:cNvPr>
+          <p:cNvSpPr>
+            <a:spLocks noGrp="1"/>
+          </p:cNvSpPr>
+          <p:nvPr>
+            <p:ph idx="1"/>
+          </p:nvPr>
+        </p:nvSpPr>
+        <p:spPr>
+          <a:xfrm>
+            <a:off x="1097280" y="1845733"/>
+            <a:ext cx="10058400" cy="4462787"/>
+          </a:xfrm>
+        </p:spPr>
+        <p:txBody>
+          <a:bodyPr anchor="ctr">
+            <a:normAutofit/>
+          </a:bodyPr>
+          <a:lstStyle/>
+          <a:p>
+            <a:pPr>
+              <a:buFont typeface="Courier New" panose="02070309020205020404" pitchFamily="49" charset="0"/>
+              <a:buChar char="o"/>
+            </a:pPr>
+            <a:r>
+              <a:rPr lang="ca-ES" sz="2400" dirty="0"/>
+              <a:t>Dades obtingudes de l’aplicació </a:t>
+            </a:r>
+            <a:r>
+              <a:rPr lang="ca-ES" sz="2400" dirty="0">
+                <a:sym typeface="Wingdings" panose="05000000000000000000" pitchFamily="2" charset="2"/>
+              </a:rPr>
+              <a:t>Imatges</a:t>
+            </a:r>
+            <a:endParaRPr lang="ca-ES" sz="2400" dirty="0"/>
+          </a:p>
+          <a:p>
+            <a:pPr>
+              <a:buFont typeface="Courier New" panose="02070309020205020404" pitchFamily="49" charset="0"/>
+              <a:buChar char="o"/>
+            </a:pPr>
+            <a:endParaRPr lang="ca-ES" sz="2400" dirty="0"/>
+          </a:p>
+          <a:p>
+            <a:pPr>
+              <a:buFont typeface="Courier New" panose="02070309020205020404" pitchFamily="49" charset="0"/>
+              <a:buChar char="o"/>
+            </a:pPr>
+            <a:r>
+              <a:rPr lang="ca-ES" sz="2400" dirty="0"/>
+              <a:t>Dades per l’entrenament de la màquina </a:t>
+            </a:r>
+            <a:r>
+              <a:rPr lang="ca-ES" sz="2400" dirty="0">
+                <a:sym typeface="Wingdings" panose="05000000000000000000" pitchFamily="2" charset="2"/>
+              </a:rPr>
+              <a:t></a:t>
+            </a:r>
+            <a:r>
+              <a:rPr lang="ca-ES" sz="2400" dirty="0" err="1">
+                <a:sym typeface="Wingdings" panose="05000000000000000000" pitchFamily="2" charset="2"/>
+              </a:rPr>
+              <a:t>One</a:t>
+            </a:r>
+            <a:r>
+              <a:rPr lang="ca-ES" sz="2400" dirty="0">
+                <a:sym typeface="Wingdings" panose="05000000000000000000" pitchFamily="2" charset="2"/>
+              </a:rPr>
+              <a:t> Hot Vectors</a:t>
+            </a:r>
+            <a:endParaRPr lang="ca-ES" sz="2400" dirty="0"/>
+          </a:p>
+          <a:p>
+            <a:pPr>
+              <a:buFont typeface="Courier New" panose="02070309020205020404" pitchFamily="49" charset="0"/>
+              <a:buChar char="o"/>
+            </a:pPr>
+            <a:endParaRPr lang="ca-ES" sz="2400" dirty="0"/>
+          </a:p>
+          <a:p>
+            <a:pPr>
+              <a:buFont typeface="Courier New" panose="02070309020205020404" pitchFamily="49" charset="0"/>
+              <a:buChar char="o"/>
+            </a:pPr>
+            <a:r>
+              <a:rPr lang="ca-ES" sz="2400" dirty="0"/>
+              <a:t>Dades generades per la màquina </a:t>
+            </a:r>
+            <a:r>
+              <a:rPr lang="ca-ES" sz="2400" dirty="0">
+                <a:sym typeface="Wingdings" panose="05000000000000000000" pitchFamily="2" charset="2"/>
+              </a:rPr>
+              <a:t> Vector d’identificadors</a:t>
+            </a:r>
+            <a:endParaRPr lang="ca-ES" sz="2400" dirty="0"/>
+          </a:p>
+        </p:txBody>
+      </p:sp>
+    </p:spTree>
+    <p:extLst>
+      <p:ext uri="{BB962C8B-B14F-4D97-AF65-F5344CB8AC3E}">
+        <p14:creationId xmlns:p14="http://schemas.microsoft.com/office/powerpoint/2010/main" val="3209208160"/>
+      </p:ext>
+    </p:extLst>
+  </p:cSld>
+  <p:clrMapOvr>
+    <a:masterClrMapping/>
+  </p:clrMapOvr>
+</p:sld>
+</file>
+
+<file path=ppt/slides/slide9.xml><?xml version="1.0" encoding="utf-8"?>
+<p:sld xmlns:a="http://schemas.openxmlformats.org/drawingml/2006/main" xmlns:r="http://schemas.openxmlformats.org/officeDocument/2006/relationships" xmlns:p="http://schemas.openxmlformats.org/presentationml/2006/main">
+  <p:cSld>
+    <p:spTree>
+      <p:nvGrpSpPr>
+        <p:cNvPr id="1" name=""/>
+        <p:cNvGrpSpPr/>
+        <p:nvPr/>
+      </p:nvGrpSpPr>
+      <p:grpSpPr>
+        <a:xfrm>
+          <a:off x="0" y="0"/>
+          <a:ext cx="0" cy="0"/>
+          <a:chOff x="0" y="0"/>
+          <a:chExt cx="0" cy="0"/>
+        </a:xfrm>
+      </p:grpSpPr>
+      <p:pic>
+        <p:nvPicPr>
+          <p:cNvPr id="7" name="Imagen 6">
+            <a:extLst>
+              <a:ext uri="{FF2B5EF4-FFF2-40B4-BE49-F238E27FC236}">
+                <a16:creationId xmlns:a16="http://schemas.microsoft.com/office/drawing/2014/main" id="{002E9A04-5DDC-4FB5-BAA9-B52FDF9BEF2D}"/>
+              </a:ext>
+            </a:extLst>
+          </p:cNvPr>
+          <p:cNvPicPr>
+            <a:picLocks noChangeAspect="1"/>
+          </p:cNvPicPr>
+          <p:nvPr/>
+        </p:nvPicPr>
+        <p:blipFill>
+          <a:blip r:embed="rId2">
+            <a:extLst>
+              <a:ext uri="{28A0092B-C50C-407E-A947-70E740481C1C}">
+                <a14:useLocalDpi xmlns:a14="http://schemas.microsoft.com/office/drawing/2010/main" val="0"/>
+              </a:ext>
+            </a:extLst>
+          </a:blip>
+          <a:stretch>
+            <a:fillRect/>
+          </a:stretch>
+        </p:blipFill>
+        <p:spPr>
+          <a:xfrm>
+            <a:off x="10285090" y="416510"/>
+            <a:ext cx="1520364" cy="457297"/>
+          </a:xfrm>
+          <a:prstGeom prst="rect">
+            <a:avLst/>
+          </a:prstGeom>
+        </p:spPr>
+      </p:pic>
+      <p:sp>
+        <p:nvSpPr>
+          <p:cNvPr id="2" name="Título 1">
+            <a:extLst>
+              <a:ext uri="{FF2B5EF4-FFF2-40B4-BE49-F238E27FC236}">
+                <a16:creationId xmlns:a16="http://schemas.microsoft.com/office/drawing/2014/main" id="{5C54A6E8-65E2-4285-8572-C5EBE11045E6}"/>
+              </a:ext>
+            </a:extLst>
+          </p:cNvPr>
+          <p:cNvSpPr>
+            <a:spLocks noGrp="1"/>
+          </p:cNvSpPr>
+          <p:nvPr>
+            <p:ph type="title"/>
+          </p:nvPr>
+        </p:nvSpPr>
+        <p:spPr>
+          <a:xfrm>
+            <a:off x="0" y="286603"/>
+            <a:ext cx="11155680" cy="1559130"/>
+          </a:xfrm>
+        </p:spPr>
+        <p:txBody>
+          <a:bodyPr anchor="ctr">
+            <a:normAutofit/>
+          </a:bodyPr>
+          <a:lstStyle/>
+          <a:p>
+            <a:pPr algn="ctr"/>
+            <a:r>
+              <a:rPr lang="ca-ES" sz="7400" dirty="0"/>
+              <a:t>AVALUACIÓ</a:t>
+            </a:r>
+          </a:p>
+        </p:txBody>
+      </p:sp>
+      <p:sp>
+        <p:nvSpPr>
+          <p:cNvPr id="3" name="Subtítulo 2">
+            <a:extLst>
+              <a:ext uri="{FF2B5EF4-FFF2-40B4-BE49-F238E27FC236}">
+                <a16:creationId xmlns:a16="http://schemas.microsoft.com/office/drawing/2014/main" id="{A66CE473-CC5F-45CD-A616-C825057A8852}"/>
+              </a:ext>
+            </a:extLst>
+          </p:cNvPr>
+          <p:cNvSpPr>
+            <a:spLocks noGrp="1"/>
+          </p:cNvSpPr>
+          <p:nvPr>
+            <p:ph idx="1"/>
+          </p:nvPr>
+        </p:nvSpPr>
+        <p:spPr>
+          <a:xfrm>
+            <a:off x="1097280" y="1602452"/>
+            <a:ext cx="10058400" cy="4462787"/>
+          </a:xfrm>
+        </p:spPr>
+        <p:txBody>
+          <a:bodyPr anchor="ctr">
+            <a:normAutofit/>
+          </a:bodyPr>
+          <a:lstStyle/>
+          <a:p>
+            <a:pPr>
+              <a:buFont typeface="Courier New" panose="02070309020205020404" pitchFamily="49" charset="0"/>
+              <a:buChar char="o"/>
+            </a:pPr>
+            <a:r>
+              <a:rPr lang="ca-ES" sz="2400" dirty="0"/>
+              <a:t> Com avaluarem el resultat obtingut?</a:t>
+            </a:r>
+          </a:p>
+          <a:p>
+            <a:pPr>
+              <a:buFont typeface="Courier New" panose="02070309020205020404" pitchFamily="49" charset="0"/>
+              <a:buChar char="o"/>
+            </a:pPr>
+            <a:endParaRPr lang="ca-ES" sz="2400" dirty="0"/>
+          </a:p>
+          <a:p>
+            <a:pPr>
+              <a:buFont typeface="Courier New" panose="02070309020205020404" pitchFamily="49" charset="0"/>
+              <a:buChar char="o"/>
+            </a:pPr>
+            <a:r>
+              <a:rPr lang="ca-ES" sz="2400" dirty="0"/>
+              <a:t> Dificultats de decidir el procediment per avaluar?</a:t>
+            </a:r>
+          </a:p>
+        </p:txBody>
+      </p:sp>
+    </p:spTree>
+    <p:extLst>
+      <p:ext uri="{BB962C8B-B14F-4D97-AF65-F5344CB8AC3E}">
+        <p14:creationId xmlns:p14="http://schemas.microsoft.com/office/powerpoint/2010/main" val="117383674"/>
       </p:ext>
     </p:extLst>
   </p:cSld>

</xml_diff>

<commit_message>
:memo: Guio afegit. Revisar
</commit_message>
<xml_diff>
--- a/Presentation/Presentacio.pptx
+++ b/Presentation/Presentacio.pptx
@@ -274,7 +274,7 @@
           <a:p>
             <a:fld id="{C4C64CF5-855B-4A89-A481-E59AD0821FB4}" type="datetimeFigureOut">
               <a:rPr lang="ca-ES" smtClean="0"/>
-              <a:t>28/6/2018</a:t>
+              <a:t>1/7/2018</a:t>
             </a:fld>
             <a:endParaRPr lang="ca-ES"/>
           </a:p>
@@ -444,7 +444,7 @@
           <a:p>
             <a:fld id="{C4C64CF5-855B-4A89-A481-E59AD0821FB4}" type="datetimeFigureOut">
               <a:rPr lang="ca-ES" smtClean="0"/>
-              <a:t>28/6/2018</a:t>
+              <a:t>1/7/2018</a:t>
             </a:fld>
             <a:endParaRPr lang="ca-ES"/>
           </a:p>
@@ -624,7 +624,7 @@
           <a:p>
             <a:fld id="{C4C64CF5-855B-4A89-A481-E59AD0821FB4}" type="datetimeFigureOut">
               <a:rPr lang="ca-ES" smtClean="0"/>
-              <a:t>28/6/2018</a:t>
+              <a:t>1/7/2018</a:t>
             </a:fld>
             <a:endParaRPr lang="ca-ES"/>
           </a:p>
@@ -827,7 +827,7 @@
           <a:p>
             <a:fld id="{C4C64CF5-855B-4A89-A481-E59AD0821FB4}" type="datetimeFigureOut">
               <a:rPr lang="ca-ES" smtClean="0"/>
-              <a:t>28/6/2018</a:t>
+              <a:t>1/7/2018</a:t>
             </a:fld>
             <a:endParaRPr lang="ca-ES"/>
           </a:p>
@@ -997,7 +997,7 @@
           <a:p>
             <a:fld id="{C4C64CF5-855B-4A89-A481-E59AD0821FB4}" type="datetimeFigureOut">
               <a:rPr lang="ca-ES" smtClean="0"/>
-              <a:t>28/6/2018</a:t>
+              <a:t>1/7/2018</a:t>
             </a:fld>
             <a:endParaRPr lang="ca-ES"/>
           </a:p>
@@ -1248,7 +1248,7 @@
           <a:p>
             <a:fld id="{C4C64CF5-855B-4A89-A481-E59AD0821FB4}" type="datetimeFigureOut">
               <a:rPr lang="ca-ES" smtClean="0"/>
-              <a:t>28/6/2018</a:t>
+              <a:t>1/7/2018</a:t>
             </a:fld>
             <a:endParaRPr lang="ca-ES"/>
           </a:p>
@@ -1480,7 +1480,7 @@
           <a:p>
             <a:fld id="{C4C64CF5-855B-4A89-A481-E59AD0821FB4}" type="datetimeFigureOut">
               <a:rPr lang="ca-ES" smtClean="0"/>
-              <a:t>28/6/2018</a:t>
+              <a:t>1/7/2018</a:t>
             </a:fld>
             <a:endParaRPr lang="ca-ES"/>
           </a:p>
@@ -1827,7 +1827,7 @@
           <a:p>
             <a:fld id="{C4C64CF5-855B-4A89-A481-E59AD0821FB4}" type="datetimeFigureOut">
               <a:rPr lang="ca-ES" smtClean="0"/>
-              <a:t>28/6/2018</a:t>
+              <a:t>1/7/2018</a:t>
             </a:fld>
             <a:endParaRPr lang="ca-ES"/>
           </a:p>
@@ -1945,7 +1945,7 @@
           <a:p>
             <a:fld id="{C4C64CF5-855B-4A89-A481-E59AD0821FB4}" type="datetimeFigureOut">
               <a:rPr lang="ca-ES" smtClean="0"/>
-              <a:t>28/6/2018</a:t>
+              <a:t>1/7/2018</a:t>
             </a:fld>
             <a:endParaRPr lang="ca-ES"/>
           </a:p>
@@ -2063,7 +2063,7 @@
           <a:p>
             <a:fld id="{C4C64CF5-855B-4A89-A481-E59AD0821FB4}" type="datetimeFigureOut">
               <a:rPr lang="ca-ES" smtClean="0"/>
-              <a:t>28/6/2018</a:t>
+              <a:t>1/7/2018</a:t>
             </a:fld>
             <a:endParaRPr lang="ca-ES"/>
           </a:p>
@@ -2347,7 +2347,7 @@
           <a:p>
             <a:fld id="{C4C64CF5-855B-4A89-A481-E59AD0821FB4}" type="datetimeFigureOut">
               <a:rPr lang="ca-ES" smtClean="0"/>
-              <a:t>28/6/2018</a:t>
+              <a:t>1/7/2018</a:t>
             </a:fld>
             <a:endParaRPr lang="ca-ES"/>
           </a:p>
@@ -2517,7 +2517,7 @@
           <a:p>
             <a:fld id="{C4C64CF5-855B-4A89-A481-E59AD0821FB4}" type="datetimeFigureOut">
               <a:rPr lang="ca-ES" smtClean="0"/>
-              <a:t>28/6/2018</a:t>
+              <a:t>1/7/2018</a:t>
             </a:fld>
             <a:endParaRPr lang="ca-ES"/>
           </a:p>
@@ -2781,7 +2781,7 @@
           <a:p>
             <a:fld id="{C4C64CF5-855B-4A89-A481-E59AD0821FB4}" type="datetimeFigureOut">
               <a:rPr lang="ca-ES" smtClean="0"/>
-              <a:t>28/6/2018</a:t>
+              <a:t>1/7/2018</a:t>
             </a:fld>
             <a:endParaRPr lang="ca-ES"/>
           </a:p>
@@ -2951,7 +2951,7 @@
           <a:p>
             <a:fld id="{C4C64CF5-855B-4A89-A481-E59AD0821FB4}" type="datetimeFigureOut">
               <a:rPr lang="ca-ES" smtClean="0"/>
-              <a:t>28/6/2018</a:t>
+              <a:t>1/7/2018</a:t>
             </a:fld>
             <a:endParaRPr lang="ca-ES"/>
           </a:p>
@@ -3131,7 +3131,7 @@
           <a:p>
             <a:fld id="{C4C64CF5-855B-4A89-A481-E59AD0821FB4}" type="datetimeFigureOut">
               <a:rPr lang="ca-ES" smtClean="0"/>
-              <a:t>28/6/2018</a:t>
+              <a:t>1/7/2018</a:t>
             </a:fld>
             <a:endParaRPr lang="ca-ES"/>
           </a:p>
@@ -3418,7 +3418,7 @@
           <a:p>
             <a:fld id="{C4C64CF5-855B-4A89-A481-E59AD0821FB4}" type="datetimeFigureOut">
               <a:rPr lang="ca-ES" smtClean="0"/>
-              <a:t>28/6/2018</a:t>
+              <a:t>1/7/2018</a:t>
             </a:fld>
             <a:endParaRPr lang="ca-ES"/>
           </a:p>
@@ -3630,7 +3630,7 @@
           <a:p>
             <a:fld id="{C4C64CF5-855B-4A89-A481-E59AD0821FB4}" type="datetimeFigureOut">
               <a:rPr lang="ca-ES" smtClean="0"/>
-              <a:t>28/6/2018</a:t>
+              <a:t>1/7/2018</a:t>
             </a:fld>
             <a:endParaRPr lang="ca-ES"/>
           </a:p>
@@ -3965,7 +3965,7 @@
           <a:p>
             <a:fld id="{C4C64CF5-855B-4A89-A481-E59AD0821FB4}" type="datetimeFigureOut">
               <a:rPr lang="ca-ES" smtClean="0"/>
-              <a:t>28/6/2018</a:t>
+              <a:t>1/7/2018</a:t>
             </a:fld>
             <a:endParaRPr lang="ca-ES"/>
           </a:p>
@@ -4240,7 +4240,7 @@
           <a:p>
             <a:fld id="{C4C64CF5-855B-4A89-A481-E59AD0821FB4}" type="datetimeFigureOut">
               <a:rPr lang="ca-ES" smtClean="0"/>
-              <a:t>28/6/2018</a:t>
+              <a:t>1/7/2018</a:t>
             </a:fld>
             <a:endParaRPr lang="ca-ES"/>
           </a:p>
@@ -4619,7 +4619,7 @@
           <a:p>
             <a:fld id="{C4C64CF5-855B-4A89-A481-E59AD0821FB4}" type="datetimeFigureOut">
               <a:rPr lang="ca-ES" smtClean="0"/>
-              <a:t>28/6/2018</a:t>
+              <a:t>1/7/2018</a:t>
             </a:fld>
             <a:endParaRPr lang="ca-ES"/>
           </a:p>
@@ -4737,7 +4737,7 @@
           <a:p>
             <a:fld id="{C4C64CF5-855B-4A89-A481-E59AD0821FB4}" type="datetimeFigureOut">
               <a:rPr lang="ca-ES" smtClean="0"/>
-              <a:t>28/6/2018</a:t>
+              <a:t>1/7/2018</a:t>
             </a:fld>
             <a:endParaRPr lang="ca-ES"/>
           </a:p>
@@ -4908,7 +4908,7 @@
           <a:p>
             <a:fld id="{C4C64CF5-855B-4A89-A481-E59AD0821FB4}" type="datetimeFigureOut">
               <a:rPr lang="ca-ES" smtClean="0"/>
-              <a:t>28/6/2018</a:t>
+              <a:t>1/7/2018</a:t>
             </a:fld>
             <a:endParaRPr lang="ca-ES"/>
           </a:p>
@@ -5167,7 +5167,7 @@
           <a:p>
             <a:fld id="{C4C64CF5-855B-4A89-A481-E59AD0821FB4}" type="datetimeFigureOut">
               <a:rPr lang="ca-ES" smtClean="0"/>
-              <a:t>28/6/2018</a:t>
+              <a:t>1/7/2018</a:t>
             </a:fld>
             <a:endParaRPr lang="ca-ES"/>
           </a:p>
@@ -5513,7 +5513,7 @@
           <a:p>
             <a:fld id="{C4C64CF5-855B-4A89-A481-E59AD0821FB4}" type="datetimeFigureOut">
               <a:rPr lang="ca-ES" smtClean="0"/>
-              <a:t>28/6/2018</a:t>
+              <a:t>1/7/2018</a:t>
             </a:fld>
             <a:endParaRPr lang="ca-ES"/>
           </a:p>
@@ -5895,7 +5895,7 @@
           <a:p>
             <a:fld id="{C4C64CF5-855B-4A89-A481-E59AD0821FB4}" type="datetimeFigureOut">
               <a:rPr lang="ca-ES" smtClean="0"/>
-              <a:t>28/6/2018</a:t>
+              <a:t>1/7/2018</a:t>
             </a:fld>
             <a:endParaRPr lang="ca-ES"/>
           </a:p>
@@ -6065,7 +6065,7 @@
           <a:p>
             <a:fld id="{C4C64CF5-855B-4A89-A481-E59AD0821FB4}" type="datetimeFigureOut">
               <a:rPr lang="ca-ES" smtClean="0"/>
-              <a:t>28/6/2018</a:t>
+              <a:t>1/7/2018</a:t>
             </a:fld>
             <a:endParaRPr lang="ca-ES"/>
           </a:p>
@@ -6321,7 +6321,7 @@
           <a:p>
             <a:fld id="{C4C64CF5-855B-4A89-A481-E59AD0821FB4}" type="datetimeFigureOut">
               <a:rPr lang="ca-ES" smtClean="0"/>
-              <a:t>28/6/2018</a:t>
+              <a:t>1/7/2018</a:t>
             </a:fld>
             <a:endParaRPr lang="ca-ES"/>
           </a:p>
@@ -6553,7 +6553,7 @@
           <a:p>
             <a:fld id="{C4C64CF5-855B-4A89-A481-E59AD0821FB4}" type="datetimeFigureOut">
               <a:rPr lang="ca-ES" smtClean="0"/>
-              <a:t>28/6/2018</a:t>
+              <a:t>1/7/2018</a:t>
             </a:fld>
             <a:endParaRPr lang="ca-ES"/>
           </a:p>
@@ -6900,7 +6900,7 @@
           <a:p>
             <a:fld id="{C4C64CF5-855B-4A89-A481-E59AD0821FB4}" type="datetimeFigureOut">
               <a:rPr lang="ca-ES" smtClean="0"/>
-              <a:t>28/6/2018</a:t>
+              <a:t>1/7/2018</a:t>
             </a:fld>
             <a:endParaRPr lang="ca-ES"/>
           </a:p>
@@ -7018,7 +7018,7 @@
           <a:p>
             <a:fld id="{C4C64CF5-855B-4A89-A481-E59AD0821FB4}" type="datetimeFigureOut">
               <a:rPr lang="ca-ES" smtClean="0"/>
-              <a:t>28/6/2018</a:t>
+              <a:t>1/7/2018</a:t>
             </a:fld>
             <a:endParaRPr lang="ca-ES"/>
           </a:p>
@@ -7136,7 +7136,7 @@
           <a:p>
             <a:fld id="{C4C64CF5-855B-4A89-A481-E59AD0821FB4}" type="datetimeFigureOut">
               <a:rPr lang="ca-ES" smtClean="0"/>
-              <a:t>28/6/2018</a:t>
+              <a:t>1/7/2018</a:t>
             </a:fld>
             <a:endParaRPr lang="ca-ES"/>
           </a:p>
@@ -7420,7 +7420,7 @@
           <a:p>
             <a:fld id="{C4C64CF5-855B-4A89-A481-E59AD0821FB4}" type="datetimeFigureOut">
               <a:rPr lang="ca-ES" smtClean="0"/>
-              <a:t>28/6/2018</a:t>
+              <a:t>1/7/2018</a:t>
             </a:fld>
             <a:endParaRPr lang="ca-ES"/>
           </a:p>
@@ -7684,7 +7684,7 @@
           <a:p>
             <a:fld id="{C4C64CF5-855B-4A89-A481-E59AD0821FB4}" type="datetimeFigureOut">
               <a:rPr lang="ca-ES" smtClean="0"/>
-              <a:t>28/6/2018</a:t>
+              <a:t>1/7/2018</a:t>
             </a:fld>
             <a:endParaRPr lang="ca-ES"/>
           </a:p>
@@ -7901,7 +7901,7 @@
           <a:p>
             <a:fld id="{C4C64CF5-855B-4A89-A481-E59AD0821FB4}" type="datetimeFigureOut">
               <a:rPr lang="ca-ES" smtClean="0"/>
-              <a:t>28/6/2018</a:t>
+              <a:t>1/7/2018</a:t>
             </a:fld>
             <a:endParaRPr lang="ca-ES"/>
           </a:p>
@@ -8434,7 +8434,7 @@
           <a:p>
             <a:fld id="{C4C64CF5-855B-4A89-A481-E59AD0821FB4}" type="datetimeFigureOut">
               <a:rPr lang="ca-ES" smtClean="0"/>
-              <a:t>28/6/2018</a:t>
+              <a:t>1/7/2018</a:t>
             </a:fld>
             <a:endParaRPr lang="ca-ES"/>
           </a:p>
@@ -9040,7 +9040,7 @@
           <a:p>
             <a:fld id="{C4C64CF5-855B-4A89-A481-E59AD0821FB4}" type="datetimeFigureOut">
               <a:rPr lang="ca-ES" smtClean="0"/>
-              <a:t>28/6/2018</a:t>
+              <a:t>1/7/2018</a:t>
             </a:fld>
             <a:endParaRPr lang="ca-ES"/>
           </a:p>
@@ -9572,7 +9572,7 @@
                 <a16:creationId xmlns:a16="http://schemas.microsoft.com/office/drawing/2014/main" id="{8C6E698C-8155-4B8B-BDC9-B7299772B509}"/>
               </a:ext>
               <a:ext uri="{C183D7F6-B498-43B3-948B-1728B52AA6E4}">
-                <adec:decorative xmlns:adec="http://schemas.microsoft.com/office/drawing/2017/decorative" xmlns="" val="1"/>
+                <adec:decorative xmlns="" xmlns:adec="http://schemas.microsoft.com/office/drawing/2017/decorative" val="1"/>
               </a:ext>
             </a:extLst>
           </p:cNvPr>
@@ -9632,7 +9632,7 @@
                 <a16:creationId xmlns:a16="http://schemas.microsoft.com/office/drawing/2014/main" id="{09525C9A-1972-4836-BA7A-706C946EF4DA}"/>
               </a:ext>
               <a:ext uri="{C183D7F6-B498-43B3-948B-1728B52AA6E4}">
-                <adec:decorative xmlns:adec="http://schemas.microsoft.com/office/drawing/2017/decorative" xmlns="" val="1"/>
+                <adec:decorative xmlns="" xmlns:adec="http://schemas.microsoft.com/office/drawing/2017/decorative" val="1"/>
               </a:ext>
             </a:extLst>
           </p:cNvPr>
@@ -9684,7 +9684,7 @@
                 <a16:creationId xmlns:a16="http://schemas.microsoft.com/office/drawing/2014/main" id="{8A549DE7-671D-4575-AF43-858FD99981CF}"/>
               </a:ext>
               <a:ext uri="{C183D7F6-B498-43B3-948B-1728B52AA6E4}">
-                <adec:decorative xmlns:adec="http://schemas.microsoft.com/office/drawing/2017/decorative" xmlns="" val="1"/>
+                <adec:decorative xmlns="" xmlns:adec="http://schemas.microsoft.com/office/drawing/2017/decorative" val="1"/>
               </a:ext>
             </a:extLst>
           </p:cNvPr>
@@ -9739,7 +9739,7 @@
                 <a16:creationId xmlns:a16="http://schemas.microsoft.com/office/drawing/2014/main" id="{C22D9B36-9BE7-472B-8808-7E0D6810738F}"/>
               </a:ext>
               <a:ext uri="{C183D7F6-B498-43B3-948B-1728B52AA6E4}">
-                <adec:decorative xmlns:adec="http://schemas.microsoft.com/office/drawing/2017/decorative" xmlns="" val="1"/>
+                <adec:decorative xmlns="" xmlns:adec="http://schemas.microsoft.com/office/drawing/2017/decorative" val="1"/>
               </a:ext>
             </a:extLst>
           </p:cNvPr>
@@ -9960,7 +9960,7 @@
                 <a16:creationId xmlns:a16="http://schemas.microsoft.com/office/drawing/2014/main" id="{B9FF99BD-075F-4761-A995-6FC574BD25EA}"/>
               </a:ext>
               <a:ext uri="{C183D7F6-B498-43B3-948B-1728B52AA6E4}">
-                <adec:decorative xmlns="" xmlns:adec="http://schemas.microsoft.com/office/drawing/2017/decorative" val="1"/>
+                <adec:decorative xmlns:adec="http://schemas.microsoft.com/office/drawing/2017/decorative" xmlns="" val="1"/>
               </a:ext>
             </a:extLst>
           </p:cNvPr>
@@ -10025,7 +10025,7 @@
                 <a16:creationId xmlns:a16="http://schemas.microsoft.com/office/drawing/2014/main" id="{A7B21A54-9BA3-4EA9-B460-5A829ADD9051}"/>
               </a:ext>
               <a:ext uri="{C183D7F6-B498-43B3-948B-1728B52AA6E4}">
-                <adec:decorative xmlns="" xmlns:adec="http://schemas.microsoft.com/office/drawing/2017/decorative" val="1"/>
+                <adec:decorative xmlns:adec="http://schemas.microsoft.com/office/drawing/2017/decorative" xmlns="" val="1"/>
               </a:ext>
             </a:extLst>
           </p:cNvPr>
@@ -10088,7 +10088,7 @@
                 <a16:creationId xmlns:a16="http://schemas.microsoft.com/office/drawing/2014/main" id="{6FA8F714-B9D8-488A-8CCA-E9948FF913A9}"/>
               </a:ext>
               <a:ext uri="{C183D7F6-B498-43B3-948B-1728B52AA6E4}">
-                <adec:decorative xmlns="" xmlns:adec="http://schemas.microsoft.com/office/drawing/2017/decorative" val="1"/>
+                <adec:decorative xmlns:adec="http://schemas.microsoft.com/office/drawing/2017/decorative" xmlns="" val="1"/>
               </a:ext>
             </a:extLst>
           </p:cNvPr>
@@ -10261,7 +10261,7 @@
                 <a16:creationId xmlns:a16="http://schemas.microsoft.com/office/drawing/2014/main" id="{B9FF99BD-075F-4761-A995-6FC574BD25EA}"/>
               </a:ext>
               <a:ext uri="{C183D7F6-B498-43B3-948B-1728B52AA6E4}">
-                <adec:decorative xmlns="" xmlns:adec="http://schemas.microsoft.com/office/drawing/2017/decorative" val="1"/>
+                <adec:decorative xmlns:adec="http://schemas.microsoft.com/office/drawing/2017/decorative" xmlns="" val="1"/>
               </a:ext>
             </a:extLst>
           </p:cNvPr>
@@ -10326,7 +10326,7 @@
                 <a16:creationId xmlns:a16="http://schemas.microsoft.com/office/drawing/2014/main" id="{A7B21A54-9BA3-4EA9-B460-5A829ADD9051}"/>
               </a:ext>
               <a:ext uri="{C183D7F6-B498-43B3-948B-1728B52AA6E4}">
-                <adec:decorative xmlns="" xmlns:adec="http://schemas.microsoft.com/office/drawing/2017/decorative" val="1"/>
+                <adec:decorative xmlns:adec="http://schemas.microsoft.com/office/drawing/2017/decorative" xmlns="" val="1"/>
               </a:ext>
             </a:extLst>
           </p:cNvPr>
@@ -10389,7 +10389,7 @@
                 <a16:creationId xmlns:a16="http://schemas.microsoft.com/office/drawing/2014/main" id="{6FA8F714-B9D8-488A-8CCA-E9948FF913A9}"/>
               </a:ext>
               <a:ext uri="{C183D7F6-B498-43B3-948B-1728B52AA6E4}">
-                <adec:decorative xmlns="" xmlns:adec="http://schemas.microsoft.com/office/drawing/2017/decorative" val="1"/>
+                <adec:decorative xmlns:adec="http://schemas.microsoft.com/office/drawing/2017/decorative" xmlns="" val="1"/>
               </a:ext>
             </a:extLst>
           </p:cNvPr>
@@ -10934,7 +10934,7 @@
         </p:nvSpPr>
         <p:spPr>
           <a:xfrm>
-            <a:off x="1097280" y="1602452"/>
+            <a:off x="1097280" y="1975640"/>
             <a:ext cx="10058400" cy="4462787"/>
           </a:xfrm>
         </p:spPr>
@@ -10971,21 +10971,51 @@
             </a:r>
           </a:p>
           <a:p>
+            <a:pPr marL="0" indent="0">
+              <a:buNone/>
+            </a:pPr>
+            <a:endParaRPr lang="ca-ES" sz="2200" dirty="0"/>
+          </a:p>
+          <a:p>
             <a:pPr>
               <a:buFont typeface="Courier New" panose="02070309020205020404" pitchFamily="49" charset="0"/>
               <a:buChar char="o"/>
             </a:pPr>
-            <a:endParaRPr lang="ca-ES" sz="2400" dirty="0"/>
+            <a:r>
+              <a:rPr lang="ca-ES" sz="2200" dirty="0"/>
+              <a:t> Utilitat real de la màquina</a:t>
+            </a:r>
           </a:p>
           <a:p>
             <a:pPr>
               <a:buFont typeface="Courier New" panose="02070309020205020404" pitchFamily="49" charset="0"/>
               <a:buChar char="o"/>
             </a:pPr>
+            <a:endParaRPr lang="ca-ES" sz="2200" dirty="0"/>
+          </a:p>
+          <a:p>
+            <a:pPr>
+              <a:buFont typeface="Courier New" panose="02070309020205020404" pitchFamily="49" charset="0"/>
+              <a:buChar char="o"/>
+            </a:pPr>
             <a:r>
               <a:rPr lang="ca-ES" sz="2200" dirty="0"/>
-              <a:t> Utilitat real de la màquina</a:t>
-            </a:r>
+              <a:t>Millores a la màquina</a:t>
+            </a:r>
+          </a:p>
+          <a:p>
+            <a:pPr>
+              <a:buFont typeface="Courier New" panose="02070309020205020404" pitchFamily="49" charset="0"/>
+              <a:buChar char="o"/>
+            </a:pPr>
+            <a:endParaRPr lang="ca-ES" sz="2200" dirty="0"/>
+          </a:p>
+          <a:p>
+            <a:pPr>
+              <a:buFont typeface="Courier New" panose="02070309020205020404" pitchFamily="49" charset="0"/>
+              <a:buChar char="o"/>
+            </a:pPr>
+            <a:endParaRPr lang="ca-ES" sz="2200" dirty="0"/>
           </a:p>
         </p:txBody>
       </p:sp>
@@ -11990,6 +12020,36 @@
           </a:prstGeom>
         </p:spPr>
       </p:pic>
+      <p:pic>
+        <p:nvPicPr>
+          <p:cNvPr id="4" name="Imagen 3">
+            <a:extLst>
+              <a:ext uri="{FF2B5EF4-FFF2-40B4-BE49-F238E27FC236}">
+                <a16:creationId xmlns:a16="http://schemas.microsoft.com/office/drawing/2014/main" id="{C744AC04-A65B-4F3B-94C2-9EDF4F462321}"/>
+              </a:ext>
+            </a:extLst>
+          </p:cNvPr>
+          <p:cNvPicPr>
+            <a:picLocks noChangeAspect="1"/>
+          </p:cNvPicPr>
+          <p:nvPr/>
+        </p:nvPicPr>
+        <p:blipFill>
+          <a:blip r:embed="rId5"/>
+          <a:stretch>
+            <a:fillRect/>
+          </a:stretch>
+        </p:blipFill>
+        <p:spPr>
+          <a:xfrm>
+            <a:off x="7089476" y="2916899"/>
+            <a:ext cx="3955796" cy="3076730"/>
+          </a:xfrm>
+          <a:prstGeom prst="rect">
+            <a:avLst/>
+          </a:prstGeom>
+        </p:spPr>
+      </p:pic>
     </p:spTree>
     <p:extLst>
       <p:ext uri="{BB962C8B-B14F-4D97-AF65-F5344CB8AC3E}">
@@ -12036,7 +12096,7 @@
                 <a16:creationId xmlns:a16="http://schemas.microsoft.com/office/drawing/2014/main" id="{A9F529C3-C941-49FD-8C67-82F134F64BDB}"/>
               </a:ext>
               <a:ext uri="{C183D7F6-B498-43B3-948B-1728B52AA6E4}">
-                <adec:decorative xmlns:adec="http://schemas.microsoft.com/office/drawing/2017/decorative" xmlns="" val="1"/>
+                <adec:decorative xmlns="" xmlns:adec="http://schemas.microsoft.com/office/drawing/2017/decorative" val="1"/>
               </a:ext>
             </a:extLst>
           </p:cNvPr>
@@ -12103,7 +12163,7 @@
                 <a16:creationId xmlns:a16="http://schemas.microsoft.com/office/drawing/2014/main" id="{20586029-32A0-47E5-9AEC-AE3ABA6B94D0}"/>
               </a:ext>
               <a:ext uri="{C183D7F6-B498-43B3-948B-1728B52AA6E4}">
-                <adec:decorative xmlns:adec="http://schemas.microsoft.com/office/drawing/2017/decorative" xmlns="" val="1"/>
+                <adec:decorative xmlns="" xmlns:adec="http://schemas.microsoft.com/office/drawing/2017/decorative" val="1"/>
               </a:ext>
             </a:extLst>
           </p:cNvPr>
@@ -12209,7 +12269,7 @@
                 <a16:creationId xmlns:a16="http://schemas.microsoft.com/office/drawing/2014/main" id="{8C730EAB-A532-4295-A302-FB4B90DB9F5E}"/>
               </a:ext>
               <a:ext uri="{C183D7F6-B498-43B3-948B-1728B52AA6E4}">
-                <adec:decorative xmlns:adec="http://schemas.microsoft.com/office/drawing/2017/decorative" xmlns="" val="1"/>
+                <adec:decorative xmlns="" xmlns:adec="http://schemas.microsoft.com/office/drawing/2017/decorative" val="1"/>
               </a:ext>
             </a:extLst>
           </p:cNvPr>

</xml_diff>